<commit_message>
Presentation - updated order - added task
</commit_message>
<xml_diff>
--- a/Presentation.pptx
+++ b/Presentation.pptx
@@ -9,7 +9,7 @@
     <p:sldMasterId id="2147483678" r:id="rId5"/>
   </p:sldMasterIdLst>
   <p:notesMasterIdLst>
-    <p:notesMasterId r:id="rId28"/>
+    <p:notesMasterId r:id="rId27"/>
   </p:notesMasterIdLst>
   <p:sldIdLst>
     <p:sldId id="256" r:id="rId6"/>
@@ -21,19 +21,18 @@
     <p:sldId id="261" r:id="rId12"/>
     <p:sldId id="273" r:id="rId13"/>
     <p:sldId id="262" r:id="rId14"/>
-    <p:sldId id="266" r:id="rId15"/>
-    <p:sldId id="274" r:id="rId16"/>
-    <p:sldId id="267" r:id="rId17"/>
-    <p:sldId id="275" r:id="rId18"/>
+    <p:sldId id="274" r:id="rId15"/>
+    <p:sldId id="267" r:id="rId16"/>
+    <p:sldId id="275" r:id="rId17"/>
+    <p:sldId id="279" r:id="rId18"/>
     <p:sldId id="276" r:id="rId19"/>
-    <p:sldId id="278" r:id="rId20"/>
-    <p:sldId id="279" r:id="rId21"/>
+    <p:sldId id="266" r:id="rId20"/>
+    <p:sldId id="278" r:id="rId21"/>
     <p:sldId id="281" r:id="rId22"/>
-    <p:sldId id="268" r:id="rId23"/>
+    <p:sldId id="282" r:id="rId23"/>
     <p:sldId id="277" r:id="rId24"/>
-    <p:sldId id="270" r:id="rId25"/>
-    <p:sldId id="269" r:id="rId26"/>
-    <p:sldId id="258" r:id="rId27"/>
+    <p:sldId id="269" r:id="rId25"/>
+    <p:sldId id="258" r:id="rId26"/>
   </p:sldIdLst>
   <p:sldSz cx="9144000" cy="6858000" type="screen4x3"/>
   <p:notesSz cx="6858000" cy="9144000"/>
@@ -218,7 +217,7 @@
             <a:fld id="{5D88816B-2D53-411B-91DB-115584640F37}" type="datetimeFigureOut">
               <a:rPr lang="pl-PL" smtClean="0"/>
               <a:pPr/>
-              <a:t>2013-07-14</a:t>
+              <a:t>2013-07-28</a:t>
             </a:fld>
             <a:endParaRPr lang="pl-PL"/>
           </a:p>
@@ -646,7 +645,32 @@
           <a:p>
             <a:r>
               <a:rPr lang="pl-PL" baseline="0" dirty="0" smtClean="0"/>
-              <a:t>Elementy w drzewku na GUI</a:t>
+              <a:t>Elementy w drzewku na </a:t>
+            </a:r>
+            <a:r>
+              <a:rPr lang="pl-PL" baseline="0" dirty="0" smtClean="0"/>
+              <a:t>GUI</a:t>
+            </a:r>
+          </a:p>
+          <a:p>
+            <a:endParaRPr lang="pl-PL" baseline="0" dirty="0" smtClean="0"/>
+          </a:p>
+          <a:p>
+            <a:r>
+              <a:rPr lang="pl-PL" baseline="0" dirty="0" smtClean="0"/>
+              <a:t>Cukier dla mechanizmu </a:t>
+            </a:r>
+            <a:r>
+              <a:rPr lang="pl-PL" baseline="0" dirty="0" err="1" smtClean="0"/>
+              <a:t>partial</a:t>
+            </a:r>
+            <a:r>
+              <a:rPr lang="pl-PL" baseline="0" dirty="0" smtClean="0"/>
+              <a:t> </a:t>
+            </a:r>
+            <a:r>
+              <a:rPr lang="pl-PL" baseline="0" dirty="0" err="1" smtClean="0"/>
+              <a:t>functions</a:t>
             </a:r>
             <a:endParaRPr lang="pl-PL" dirty="0"/>
           </a:p>
@@ -670,7 +694,7 @@
             <a:fld id="{5DFAB087-39D9-4EAE-81A4-A4B45D677425}" type="slidenum">
               <a:rPr lang="pl-PL" smtClean="0"/>
               <a:pPr/>
-              <a:t>13</a:t>
+              <a:t>12</a:t>
             </a:fld>
             <a:endParaRPr lang="pl-PL"/>
           </a:p>
@@ -760,7 +784,516 @@
             <a:fld id="{5DFAB087-39D9-4EAE-81A4-A4B45D677425}" type="slidenum">
               <a:rPr lang="pl-PL" smtClean="0"/>
               <a:pPr/>
-              <a:t>16</a:t>
+              <a:t>13</a:t>
+            </a:fld>
+            <a:endParaRPr lang="pl-PL"/>
+          </a:p>
+        </p:txBody>
+      </p:sp>
+    </p:spTree>
+  </p:cSld>
+  <p:clrMapOvr>
+    <a:masterClrMapping/>
+  </p:clrMapOvr>
+</p:notes>
+</file>
+
+<file path=ppt/notesSlides/notesSlide12.xml><?xml version="1.0" encoding="utf-8"?>
+<p:notes xmlns:a="http://schemas.openxmlformats.org/drawingml/2006/main" xmlns:r="http://schemas.openxmlformats.org/officeDocument/2006/relationships" xmlns:p="http://schemas.openxmlformats.org/presentationml/2006/main">
+  <p:cSld>
+    <p:spTree>
+      <p:nvGrpSpPr>
+        <p:cNvPr id="1" name=""/>
+        <p:cNvGrpSpPr/>
+        <p:nvPr/>
+      </p:nvGrpSpPr>
+      <p:grpSpPr>
+        <a:xfrm>
+          <a:off x="0" y="0"/>
+          <a:ext cx="0" cy="0"/>
+          <a:chOff x="0" y="0"/>
+          <a:chExt cx="0" cy="0"/>
+        </a:xfrm>
+      </p:grpSpPr>
+      <p:sp>
+        <p:nvSpPr>
+          <p:cNvPr id="2" name="Symbol zastępczy obrazu slajdu 1"/>
+          <p:cNvSpPr>
+            <a:spLocks noGrp="1" noRot="1" noChangeAspect="1"/>
+          </p:cNvSpPr>
+          <p:nvPr>
+            <p:ph type="sldImg"/>
+          </p:nvPr>
+        </p:nvSpPr>
+        <p:spPr/>
+      </p:sp>
+      <p:sp>
+        <p:nvSpPr>
+          <p:cNvPr id="3" name="Symbol zastępczy notatek 2"/>
+          <p:cNvSpPr>
+            <a:spLocks noGrp="1"/>
+          </p:cNvSpPr>
+          <p:nvPr>
+            <p:ph type="body" idx="1"/>
+          </p:nvPr>
+        </p:nvSpPr>
+        <p:spPr/>
+        <p:txBody>
+          <a:bodyPr>
+            <a:normAutofit/>
+          </a:bodyPr>
+          <a:lstStyle/>
+          <a:p>
+            <a:r>
+              <a:rPr lang="pl-PL" dirty="0" smtClean="0"/>
+              <a:t>Function1 odpowiada </a:t>
+            </a:r>
+            <a:r>
+              <a:rPr lang="pl-PL" dirty="0" err="1" smtClean="0"/>
+              <a:t>Function</a:t>
+            </a:r>
+            <a:r>
+              <a:rPr lang="pl-PL" dirty="0" smtClean="0"/>
+              <a:t> w </a:t>
+            </a:r>
+            <a:r>
+              <a:rPr lang="pl-PL" dirty="0" err="1" smtClean="0"/>
+              <a:t>Guavie</a:t>
+            </a:r>
+            <a:endParaRPr lang="pl-PL" dirty="0" smtClean="0"/>
+          </a:p>
+          <a:p>
+            <a:r>
+              <a:rPr lang="pl-PL" dirty="0" err="1" smtClean="0"/>
+              <a:t>Function&lt;T</a:t>
+            </a:r>
+            <a:r>
+              <a:rPr lang="pl-PL" dirty="0" smtClean="0"/>
+              <a:t>, </a:t>
+            </a:r>
+            <a:r>
+              <a:rPr lang="pl-PL" dirty="0" err="1" smtClean="0"/>
+              <a:t>Boolean</a:t>
+            </a:r>
+            <a:r>
+              <a:rPr lang="pl-PL" dirty="0" smtClean="0"/>
+              <a:t>&gt; odpowiada </a:t>
+            </a:r>
+            <a:r>
+              <a:rPr lang="pl-PL" dirty="0" err="1" smtClean="0"/>
+              <a:t>Predicate</a:t>
+            </a:r>
+            <a:r>
+              <a:rPr lang="pl-PL" dirty="0" smtClean="0"/>
+              <a:t> w </a:t>
+            </a:r>
+            <a:r>
+              <a:rPr lang="pl-PL" dirty="0" err="1" smtClean="0"/>
+              <a:t>Guavie</a:t>
+            </a:r>
+            <a:endParaRPr lang="pl-PL" dirty="0" smtClean="0"/>
+          </a:p>
+          <a:p>
+            <a:r>
+              <a:rPr lang="pl-PL" dirty="0" err="1" smtClean="0"/>
+              <a:t>Currying</a:t>
+            </a:r>
+            <a:r>
+              <a:rPr lang="pl-PL" baseline="0" dirty="0" smtClean="0"/>
+              <a:t> to rozwiązanie, gdy wywołujemy tę samą funkcję wiele razy, zmieniając tylko ostatni parametr</a:t>
+            </a:r>
+          </a:p>
+          <a:p>
+            <a:r>
+              <a:rPr lang="pl-PL" dirty="0" smtClean="0"/>
+              <a:t>Wykorzystanie</a:t>
+            </a:r>
+            <a:r>
+              <a:rPr lang="pl-PL" baseline="0" dirty="0" smtClean="0"/>
+              <a:t> interfejsów daje taką samą kompozycję, ale robi piekiełko w stylu </a:t>
+            </a:r>
+            <a:r>
+              <a:rPr lang="pl-PL" baseline="0" dirty="0" err="1" smtClean="0"/>
+              <a:t>IProblem</a:t>
+            </a:r>
+            <a:r>
+              <a:rPr lang="pl-PL" baseline="0" dirty="0" smtClean="0"/>
+              <a:t> i </a:t>
+            </a:r>
+            <a:r>
+              <a:rPr lang="pl-PL" baseline="0" dirty="0" err="1" smtClean="0"/>
+              <a:t>ProblemFactory</a:t>
+            </a:r>
+            <a:endParaRPr lang="pl-PL" baseline="0" dirty="0" smtClean="0"/>
+          </a:p>
+          <a:p>
+            <a:r>
+              <a:rPr lang="pl-PL" dirty="0" smtClean="0"/>
+              <a:t>Najpierw</a:t>
+            </a:r>
+            <a:r>
+              <a:rPr lang="pl-PL" baseline="0" dirty="0" smtClean="0"/>
+              <a:t> </a:t>
+            </a:r>
+            <a:r>
+              <a:rPr lang="pl-PL" baseline="0" dirty="0" err="1" smtClean="0"/>
+              <a:t>BooksFilter</a:t>
+            </a:r>
+            <a:r>
+              <a:rPr lang="pl-PL" baseline="0" dirty="0" smtClean="0"/>
+              <a:t>. Swoją drogą bardzo dobre zaprezentowanie elegancji </a:t>
+            </a:r>
+            <a:r>
+              <a:rPr lang="pl-PL" baseline="0" dirty="0" err="1" smtClean="0"/>
+              <a:t>for-comprehension</a:t>
+            </a:r>
+            <a:endParaRPr lang="pl-PL" dirty="0" smtClean="0"/>
+          </a:p>
+        </p:txBody>
+      </p:sp>
+      <p:sp>
+        <p:nvSpPr>
+          <p:cNvPr id="4" name="Symbol zastępczy numeru slajdu 3"/>
+          <p:cNvSpPr>
+            <a:spLocks noGrp="1"/>
+          </p:cNvSpPr>
+          <p:nvPr>
+            <p:ph type="sldNum" sz="quarter" idx="10"/>
+          </p:nvPr>
+        </p:nvSpPr>
+        <p:spPr/>
+        <p:txBody>
+          <a:bodyPr/>
+          <a:lstStyle/>
+          <a:p>
+            <a:fld id="{5DFAB087-39D9-4EAE-81A4-A4B45D677425}" type="slidenum">
+              <a:rPr lang="pl-PL" smtClean="0"/>
+              <a:pPr/>
+              <a:t>15</a:t>
+            </a:fld>
+            <a:endParaRPr lang="pl-PL"/>
+          </a:p>
+        </p:txBody>
+      </p:sp>
+    </p:spTree>
+  </p:cSld>
+  <p:clrMapOvr>
+    <a:masterClrMapping/>
+  </p:clrMapOvr>
+</p:notes>
+</file>
+
+<file path=ppt/notesSlides/notesSlide13.xml><?xml version="1.0" encoding="utf-8"?>
+<p:notes xmlns:a="http://schemas.openxmlformats.org/drawingml/2006/main" xmlns:r="http://schemas.openxmlformats.org/officeDocument/2006/relationships" xmlns:p="http://schemas.openxmlformats.org/presentationml/2006/main">
+  <p:cSld>
+    <p:spTree>
+      <p:nvGrpSpPr>
+        <p:cNvPr id="1" name=""/>
+        <p:cNvGrpSpPr/>
+        <p:nvPr/>
+      </p:nvGrpSpPr>
+      <p:grpSpPr>
+        <a:xfrm>
+          <a:off x="0" y="0"/>
+          <a:ext cx="0" cy="0"/>
+          <a:chOff x="0" y="0"/>
+          <a:chExt cx="0" cy="0"/>
+        </a:xfrm>
+      </p:grpSpPr>
+      <p:sp>
+        <p:nvSpPr>
+          <p:cNvPr id="2" name="Symbol zastępczy obrazu slajdu 1"/>
+          <p:cNvSpPr>
+            <a:spLocks noGrp="1" noRot="1" noChangeAspect="1"/>
+          </p:cNvSpPr>
+          <p:nvPr>
+            <p:ph type="sldImg"/>
+          </p:nvPr>
+        </p:nvSpPr>
+        <p:spPr/>
+      </p:sp>
+      <p:sp>
+        <p:nvSpPr>
+          <p:cNvPr id="3" name="Symbol zastępczy notatek 2"/>
+          <p:cNvSpPr>
+            <a:spLocks noGrp="1"/>
+          </p:cNvSpPr>
+          <p:nvPr>
+            <p:ph type="body" idx="1"/>
+          </p:nvPr>
+        </p:nvSpPr>
+        <p:spPr/>
+        <p:txBody>
+          <a:bodyPr>
+            <a:normAutofit/>
+          </a:bodyPr>
+          <a:lstStyle/>
+          <a:p>
+            <a:r>
+              <a:rPr lang="pl-PL" dirty="0" err="1" smtClean="0"/>
+              <a:t>RichString</a:t>
+            </a:r>
+            <a:r>
+              <a:rPr lang="pl-PL" baseline="0" dirty="0" smtClean="0"/>
+              <a:t> dodaje metody dla kolekcji</a:t>
+            </a:r>
+          </a:p>
+          <a:p>
+            <a:r>
+              <a:rPr lang="pl-PL" baseline="0" dirty="0" err="1" smtClean="0"/>
+              <a:t>RichInt</a:t>
+            </a:r>
+            <a:r>
+              <a:rPr lang="pl-PL" baseline="0" dirty="0" smtClean="0"/>
+              <a:t> dodaje to/</a:t>
+            </a:r>
+            <a:r>
+              <a:rPr lang="pl-PL" baseline="0" dirty="0" err="1" smtClean="0"/>
+              <a:t>until</a:t>
+            </a:r>
+            <a:r>
+              <a:rPr lang="pl-PL" baseline="0" dirty="0" smtClean="0"/>
+              <a:t>. To jest fajne, że dzięki </a:t>
+            </a:r>
+            <a:r>
+              <a:rPr lang="pl-PL" baseline="0" dirty="0" err="1" smtClean="0"/>
+              <a:t>Implicits</a:t>
+            </a:r>
+            <a:r>
+              <a:rPr lang="pl-PL" baseline="0" dirty="0" smtClean="0"/>
+              <a:t> nie ma w tym żadnej magii, można takie metody dla dowolnego własnego typu dodać</a:t>
+            </a:r>
+            <a:endParaRPr lang="pl-PL" dirty="0"/>
+          </a:p>
+        </p:txBody>
+      </p:sp>
+      <p:sp>
+        <p:nvSpPr>
+          <p:cNvPr id="4" name="Symbol zastępczy numeru slajdu 3"/>
+          <p:cNvSpPr>
+            <a:spLocks noGrp="1"/>
+          </p:cNvSpPr>
+          <p:nvPr>
+            <p:ph type="sldNum" sz="quarter" idx="10"/>
+          </p:nvPr>
+        </p:nvSpPr>
+        <p:spPr/>
+        <p:txBody>
+          <a:bodyPr/>
+          <a:lstStyle/>
+          <a:p>
+            <a:fld id="{5DFAB087-39D9-4EAE-81A4-A4B45D677425}" type="slidenum">
+              <a:rPr lang="pl-PL" smtClean="0"/>
+              <a:pPr/>
+              <a:t>17</a:t>
+            </a:fld>
+            <a:endParaRPr lang="pl-PL"/>
+          </a:p>
+        </p:txBody>
+      </p:sp>
+    </p:spTree>
+  </p:cSld>
+  <p:clrMapOvr>
+    <a:masterClrMapping/>
+  </p:clrMapOvr>
+</p:notes>
+</file>
+
+<file path=ppt/notesSlides/notesSlide14.xml><?xml version="1.0" encoding="utf-8"?>
+<p:notes xmlns:a="http://schemas.openxmlformats.org/drawingml/2006/main" xmlns:r="http://schemas.openxmlformats.org/officeDocument/2006/relationships" xmlns:p="http://schemas.openxmlformats.org/presentationml/2006/main">
+  <p:cSld>
+    <p:spTree>
+      <p:nvGrpSpPr>
+        <p:cNvPr id="1" name=""/>
+        <p:cNvGrpSpPr/>
+        <p:nvPr/>
+      </p:nvGrpSpPr>
+      <p:grpSpPr>
+        <a:xfrm>
+          <a:off x="0" y="0"/>
+          <a:ext cx="0" cy="0"/>
+          <a:chOff x="0" y="0"/>
+          <a:chExt cx="0" cy="0"/>
+        </a:xfrm>
+      </p:grpSpPr>
+      <p:sp>
+        <p:nvSpPr>
+          <p:cNvPr id="2" name="Symbol zastępczy obrazu slajdu 1"/>
+          <p:cNvSpPr>
+            <a:spLocks noGrp="1" noRot="1" noChangeAspect="1"/>
+          </p:cNvSpPr>
+          <p:nvPr>
+            <p:ph type="sldImg"/>
+          </p:nvPr>
+        </p:nvSpPr>
+        <p:spPr/>
+      </p:sp>
+      <p:sp>
+        <p:nvSpPr>
+          <p:cNvPr id="3" name="Symbol zastępczy notatek 2"/>
+          <p:cNvSpPr>
+            <a:spLocks noGrp="1"/>
+          </p:cNvSpPr>
+          <p:nvPr>
+            <p:ph type="body" idx="1"/>
+          </p:nvPr>
+        </p:nvSpPr>
+        <p:spPr/>
+        <p:txBody>
+          <a:bodyPr>
+            <a:normAutofit/>
+          </a:bodyPr>
+          <a:lstStyle/>
+          <a:p>
+            <a:r>
+              <a:rPr lang="pl-PL" dirty="0" smtClean="0"/>
+              <a:t>Można</a:t>
+            </a:r>
+            <a:r>
+              <a:rPr lang="pl-PL" baseline="0" dirty="0" smtClean="0"/>
+              <a:t> pisać dowolne operatory, również unarne</a:t>
+            </a:r>
+          </a:p>
+          <a:p>
+            <a:r>
+              <a:rPr lang="pl-PL" baseline="0" dirty="0" smtClean="0"/>
+              <a:t>Eksperymentalnie makra, które po rozwinięciu mogą nam zaoszczędzić trochę kodu i zapewnić dalej statyczne typowanie</a:t>
+            </a:r>
+          </a:p>
+          <a:p>
+            <a:r>
+              <a:rPr lang="pl-PL" baseline="0" dirty="0" smtClean="0"/>
+              <a:t>Wartości można poprzedzić słowem kluczowym </a:t>
+            </a:r>
+            <a:r>
+              <a:rPr lang="pl-PL" baseline="0" dirty="0" err="1" smtClean="0"/>
+              <a:t>lazy</a:t>
+            </a:r>
+            <a:r>
+              <a:rPr lang="pl-PL" baseline="0" dirty="0" smtClean="0"/>
+              <a:t>, dzięki któremu zostaną obliczone przy pierwszym wywołaniu</a:t>
+            </a:r>
+          </a:p>
+          <a:p>
+            <a:r>
+              <a:rPr lang="pl-PL" baseline="0" dirty="0" smtClean="0"/>
+              <a:t>Wsparcie dla niezmienności można sprowadzić do tego, że prawie wszystko domyślnie jest niezmiennie (słówko </a:t>
+            </a:r>
+            <a:r>
+              <a:rPr lang="pl-PL" baseline="0" dirty="0" err="1" smtClean="0"/>
+              <a:t>val</a:t>
+            </a:r>
+            <a:r>
+              <a:rPr lang="pl-PL" baseline="0" dirty="0" smtClean="0"/>
+              <a:t> </a:t>
+            </a:r>
+            <a:r>
+              <a:rPr lang="pl-PL" baseline="0" dirty="0" err="1" smtClean="0"/>
+              <a:t>vs</a:t>
+            </a:r>
+            <a:r>
+              <a:rPr lang="pl-PL" baseline="0" dirty="0" smtClean="0"/>
+              <a:t> </a:t>
+            </a:r>
+            <a:r>
+              <a:rPr lang="pl-PL" baseline="0" dirty="0" err="1" smtClean="0"/>
+              <a:t>var</a:t>
+            </a:r>
+            <a:r>
+              <a:rPr lang="pl-PL" baseline="0" dirty="0" smtClean="0"/>
+              <a:t>)</a:t>
+            </a:r>
+          </a:p>
+          <a:p>
+            <a:r>
+              <a:rPr lang="pl-PL" baseline="0" dirty="0" err="1" smtClean="0"/>
+              <a:t>Option</a:t>
+            </a:r>
+            <a:r>
+              <a:rPr lang="pl-PL" baseline="0" dirty="0" smtClean="0"/>
+              <a:t> przypomina ten z </a:t>
+            </a:r>
+            <a:r>
+              <a:rPr lang="pl-PL" baseline="0" dirty="0" err="1" smtClean="0"/>
+              <a:t>guavy</a:t>
+            </a:r>
+            <a:r>
+              <a:rPr lang="pl-PL" baseline="0" dirty="0" smtClean="0"/>
+              <a:t>, ale na sterydach</a:t>
+            </a:r>
+          </a:p>
+          <a:p>
+            <a:r>
+              <a:rPr lang="pl-PL" baseline="0" dirty="0" smtClean="0"/>
+              <a:t>Monady to koncept, który pokazuje, że klasy List, </a:t>
+            </a:r>
+            <a:r>
+              <a:rPr lang="pl-PL" baseline="0" dirty="0" err="1" smtClean="0"/>
+              <a:t>Option</a:t>
+            </a:r>
+            <a:r>
+              <a:rPr lang="pl-PL" baseline="0" dirty="0" smtClean="0"/>
+              <a:t>, </a:t>
+            </a:r>
+            <a:r>
+              <a:rPr lang="pl-PL" baseline="0" dirty="0" err="1" smtClean="0"/>
+              <a:t>Future</a:t>
+            </a:r>
+            <a:r>
+              <a:rPr lang="pl-PL" baseline="0" dirty="0" smtClean="0"/>
+              <a:t>, </a:t>
+            </a:r>
+            <a:r>
+              <a:rPr lang="pl-PL" baseline="0" dirty="0" err="1" smtClean="0"/>
+              <a:t>Validation</a:t>
+            </a:r>
+            <a:r>
+              <a:rPr lang="pl-PL" baseline="0" dirty="0" smtClean="0"/>
+              <a:t> robią praktycznie to samo</a:t>
+            </a:r>
+          </a:p>
+          <a:p>
+            <a:r>
+              <a:rPr lang="pl-PL" baseline="0" dirty="0" err="1" smtClean="0"/>
+              <a:t>Cake</a:t>
+            </a:r>
+            <a:r>
+              <a:rPr lang="pl-PL" baseline="0" dirty="0" smtClean="0"/>
+              <a:t> </a:t>
+            </a:r>
+            <a:r>
+              <a:rPr lang="pl-PL" baseline="0" dirty="0" err="1" smtClean="0"/>
+              <a:t>Pattern</a:t>
+            </a:r>
+            <a:r>
+              <a:rPr lang="pl-PL" baseline="0" dirty="0" smtClean="0"/>
+              <a:t> to wstrzykiwanie zależności ze sprawdzaniem w czasie kompilacji</a:t>
+            </a:r>
+          </a:p>
+          <a:p>
+            <a:endParaRPr lang="pl-PL" dirty="0"/>
+          </a:p>
+        </p:txBody>
+      </p:sp>
+      <p:sp>
+        <p:nvSpPr>
+          <p:cNvPr id="4" name="Symbol zastępczy numeru slajdu 3"/>
+          <p:cNvSpPr>
+            <a:spLocks noGrp="1"/>
+          </p:cNvSpPr>
+          <p:nvPr>
+            <p:ph type="sldNum" sz="quarter" idx="10"/>
+          </p:nvPr>
+        </p:nvSpPr>
+        <p:spPr/>
+        <p:txBody>
+          <a:bodyPr/>
+          <a:lstStyle/>
+          <a:p>
+            <a:fld id="{5DFAB087-39D9-4EAE-81A4-A4B45D677425}" type="slidenum">
+              <a:rPr lang="pl-PL" smtClean="0"/>
+              <a:pPr/>
+              <a:t>18</a:t>
             </a:fld>
             <a:endParaRPr lang="pl-PL"/>
           </a:p>
@@ -1389,87 +1922,7 @@
           </a:bodyPr>
           <a:lstStyle/>
           <a:p>
-            <a:r>
-              <a:rPr lang="pl-PL" dirty="0" smtClean="0"/>
-              <a:t>Function1 odpowiada </a:t>
-            </a:r>
-            <a:r>
-              <a:rPr lang="pl-PL" dirty="0" err="1" smtClean="0"/>
-              <a:t>Function</a:t>
-            </a:r>
-            <a:r>
-              <a:rPr lang="pl-PL" dirty="0" smtClean="0"/>
-              <a:t> w </a:t>
-            </a:r>
-            <a:r>
-              <a:rPr lang="pl-PL" dirty="0" err="1" smtClean="0"/>
-              <a:t>Guavie</a:t>
-            </a:r>
-            <a:endParaRPr lang="pl-PL" dirty="0" smtClean="0"/>
-          </a:p>
-          <a:p>
-            <a:r>
-              <a:rPr lang="pl-PL" dirty="0" err="1" smtClean="0"/>
-              <a:t>Function&lt;T</a:t>
-            </a:r>
-            <a:r>
-              <a:rPr lang="pl-PL" dirty="0" smtClean="0"/>
-              <a:t>, </a:t>
-            </a:r>
-            <a:r>
-              <a:rPr lang="pl-PL" dirty="0" err="1" smtClean="0"/>
-              <a:t>Boolean</a:t>
-            </a:r>
-            <a:r>
-              <a:rPr lang="pl-PL" dirty="0" smtClean="0"/>
-              <a:t>&gt; odpowiada </a:t>
-            </a:r>
-            <a:r>
-              <a:rPr lang="pl-PL" dirty="0" err="1" smtClean="0"/>
-              <a:t>Predicate</a:t>
-            </a:r>
-            <a:r>
-              <a:rPr lang="pl-PL" dirty="0" smtClean="0"/>
-              <a:t> w </a:t>
-            </a:r>
-            <a:r>
-              <a:rPr lang="pl-PL" dirty="0" err="1" smtClean="0"/>
-              <a:t>Guavie</a:t>
-            </a:r>
-            <a:endParaRPr lang="pl-PL" dirty="0" smtClean="0"/>
-          </a:p>
-          <a:p>
-            <a:r>
-              <a:rPr lang="pl-PL" dirty="0" err="1" smtClean="0"/>
-              <a:t>Currying</a:t>
-            </a:r>
-            <a:r>
-              <a:rPr lang="pl-PL" baseline="0" dirty="0" smtClean="0"/>
-              <a:t> to rozwiązanie, gdy wywołujemy tę samą funkcję wiele razy, zmieniając tylko ostatni parametr</a:t>
-            </a:r>
-          </a:p>
-          <a:p>
-            <a:r>
-              <a:rPr lang="pl-PL" dirty="0" smtClean="0"/>
-              <a:t>Wykorzystanie</a:t>
-            </a:r>
-            <a:r>
-              <a:rPr lang="pl-PL" baseline="0" dirty="0" smtClean="0"/>
-              <a:t> interfejsów daje taką samą kompozycję, ale robi piekiełko w stylu </a:t>
-            </a:r>
-            <a:r>
-              <a:rPr lang="pl-PL" baseline="0" dirty="0" err="1" smtClean="0"/>
-              <a:t>IProblem</a:t>
-            </a:r>
-            <a:r>
-              <a:rPr lang="pl-PL" baseline="0" dirty="0" smtClean="0"/>
-              <a:t> i </a:t>
-            </a:r>
-            <a:r>
-              <a:rPr lang="pl-PL" baseline="0" dirty="0" err="1" smtClean="0"/>
-              <a:t>ProblemFactory</a:t>
-            </a:r>
-            <a:endParaRPr lang="pl-PL" dirty="0" smtClean="0"/>
+            <a:endParaRPr lang="pl-PL" dirty="0"/>
           </a:p>
         </p:txBody>
       </p:sp>
@@ -1553,7 +2006,34 @@
           <a:p>
             <a:r>
               <a:rPr lang="pl-PL" baseline="0" dirty="0" smtClean="0"/>
-              <a:t>To nie jest wszystkie, jeszcze dochodzą rzeczy ułatwiające </a:t>
+              <a:t>Przykład: </a:t>
+            </a:r>
+            <a:r>
+              <a:rPr lang="pl-PL" baseline="0" dirty="0" err="1" smtClean="0"/>
+              <a:t>pattern_matching</a:t>
+            </a:r>
+            <a:endParaRPr lang="pl-PL" baseline="0" dirty="0" smtClean="0"/>
+          </a:p>
+          <a:p>
+            <a:r>
+              <a:rPr lang="pl-PL" baseline="0" dirty="0" smtClean="0"/>
+              <a:t>W porównaniu z Javą zmniejszenie kodu o 70-80%</a:t>
+            </a:r>
+          </a:p>
+          <a:p>
+            <a:r>
+              <a:rPr lang="pl-PL" baseline="0" dirty="0" smtClean="0"/>
+              <a:t>Tworzenie klas jest proste i tanie, szczególnie mogąc utworzyć wiele klas w jednym pliku</a:t>
+            </a:r>
+          </a:p>
+          <a:p>
+            <a:r>
+              <a:rPr lang="pl-PL" baseline="0" dirty="0" smtClean="0"/>
+              <a:t>To </a:t>
+            </a:r>
+            <a:r>
+              <a:rPr lang="pl-PL" baseline="0" dirty="0" smtClean="0"/>
+              <a:t>nie jest wszystkie, jeszcze dochodzą rzeczy ułatwiające </a:t>
             </a:r>
             <a:r>
               <a:rPr lang="pl-PL" baseline="0" dirty="0" err="1" smtClean="0"/>
@@ -1589,7 +2069,7 @@
             <a:fld id="{5DFAB087-39D9-4EAE-81A4-A4B45D677425}" type="slidenum">
               <a:rPr lang="pl-PL" smtClean="0"/>
               <a:pPr/>
-              <a:t>12</a:t>
+              <a:t>11</a:t>
             </a:fld>
             <a:endParaRPr lang="pl-PL"/>
           </a:p>
@@ -1836,7 +2316,7 @@
             <a:fld id="{359484F7-7C7A-4895-B82F-27C098609AFF}" type="datetime1">
               <a:rPr lang="pl-PL" smtClean="0"/>
               <a:pPr/>
-              <a:t>2013-07-14</a:t>
+              <a:t>2013-07-28</a:t>
             </a:fld>
             <a:r>
               <a:rPr lang="pl-PL" smtClean="0"/>
@@ -1915,7 +2395,7 @@
             <a:fld id="{359484F7-7C7A-4895-B82F-27C098609AFF}" type="datetime1">
               <a:rPr lang="pl-PL" smtClean="0"/>
               <a:pPr/>
-              <a:t>2013-07-14</a:t>
+              <a:t>2013-07-28</a:t>
             </a:fld>
             <a:r>
               <a:rPr lang="pl-PL" smtClean="0"/>
@@ -2483,7 +2963,7 @@
             <a:fld id="{359484F7-7C7A-4895-B82F-27C098609AFF}" type="datetime1">
               <a:rPr lang="pl-PL" smtClean="0"/>
               <a:pPr/>
-              <a:t>2013-07-14</a:t>
+              <a:t>2013-07-28</a:t>
             </a:fld>
             <a:r>
               <a:rPr lang="pl-PL" smtClean="0"/>
@@ -2548,7 +3028,7 @@
             <a:fld id="{359484F7-7C7A-4895-B82F-27C098609AFF}" type="datetime1">
               <a:rPr lang="pl-PL" smtClean="0"/>
               <a:pPr/>
-              <a:t>2013-07-14</a:t>
+              <a:t>2013-07-28</a:t>
             </a:fld>
             <a:r>
               <a:rPr lang="pl-PL" smtClean="0"/>
@@ -2755,7 +3235,7 @@
             <a:fld id="{359484F7-7C7A-4895-B82F-27C098609AFF}" type="datetime1">
               <a:rPr lang="pl-PL" smtClean="0"/>
               <a:pPr/>
-              <a:t>2013-07-14</a:t>
+              <a:t>2013-07-28</a:t>
             </a:fld>
             <a:r>
               <a:rPr lang="pl-PL" smtClean="0"/>
@@ -2946,7 +3426,7 @@
             <a:fld id="{359484F7-7C7A-4895-B82F-27C098609AFF}" type="datetime1">
               <a:rPr lang="pl-PL" smtClean="0"/>
               <a:pPr/>
-              <a:t>2013-07-14</a:t>
+              <a:t>2013-07-28</a:t>
             </a:fld>
             <a:r>
               <a:rPr lang="pl-PL" smtClean="0"/>
@@ -3153,7 +3633,7 @@
             <a:fld id="{359484F7-7C7A-4895-B82F-27C098609AFF}" type="datetime1">
               <a:rPr lang="pl-PL" smtClean="0"/>
               <a:pPr/>
-              <a:t>2013-07-14</a:t>
+              <a:t>2013-07-28</a:t>
             </a:fld>
             <a:r>
               <a:rPr lang="pl-PL" smtClean="0"/>
@@ -3344,7 +3824,7 @@
             <a:fld id="{359484F7-7C7A-4895-B82F-27C098609AFF}" type="datetime1">
               <a:rPr lang="pl-PL" smtClean="0"/>
               <a:pPr/>
-              <a:t>2013-07-14</a:t>
+              <a:t>2013-07-28</a:t>
             </a:fld>
             <a:r>
               <a:rPr lang="pl-PL" smtClean="0"/>
@@ -3551,7 +4031,7 @@
             <a:fld id="{359484F7-7C7A-4895-B82F-27C098609AFF}" type="datetime1">
               <a:rPr lang="pl-PL" smtClean="0"/>
               <a:pPr/>
-              <a:t>2013-07-14</a:t>
+              <a:t>2013-07-28</a:t>
             </a:fld>
             <a:r>
               <a:rPr lang="pl-PL" smtClean="0"/>
@@ -3742,7 +4222,7 @@
             <a:fld id="{359484F7-7C7A-4895-B82F-27C098609AFF}" type="datetime1">
               <a:rPr lang="pl-PL" smtClean="0"/>
               <a:pPr/>
-              <a:t>2013-07-14</a:t>
+              <a:t>2013-07-28</a:t>
             </a:fld>
             <a:r>
               <a:rPr lang="pl-PL" smtClean="0"/>
@@ -3969,7 +4449,7 @@
             <a:fld id="{359484F7-7C7A-4895-B82F-27C098609AFF}" type="datetime1">
               <a:rPr lang="pl-PL" smtClean="0"/>
               <a:pPr/>
-              <a:t>2013-07-14</a:t>
+              <a:t>2013-07-28</a:t>
             </a:fld>
             <a:r>
               <a:rPr lang="pl-PL" smtClean="0"/>
@@ -4321,7 +4801,7 @@
             <a:fld id="{359484F7-7C7A-4895-B82F-27C098609AFF}" type="datetime1">
               <a:rPr lang="pl-PL" smtClean="0"/>
               <a:pPr/>
-              <a:t>2013-07-14</a:t>
+              <a:t>2013-07-28</a:t>
             </a:fld>
             <a:r>
               <a:rPr lang="pl-PL" dirty="0" smtClean="0"/>
@@ -4897,7 +5377,7 @@
             <a:fld id="{359484F7-7C7A-4895-B82F-27C098609AFF}" type="datetime1">
               <a:rPr lang="pl-PL" smtClean="0"/>
               <a:pPr/>
-              <a:t>2013-07-14</a:t>
+              <a:t>2013-07-28</a:t>
             </a:fld>
             <a:r>
               <a:rPr lang="pl-PL" smtClean="0"/>
@@ -5473,7 +5953,7 @@
             <a:fld id="{359484F7-7C7A-4895-B82F-27C098609AFF}" type="datetime1">
               <a:rPr lang="pl-PL" smtClean="0"/>
               <a:pPr/>
-              <a:t>2013-07-14</a:t>
+              <a:t>2013-07-28</a:t>
             </a:fld>
             <a:r>
               <a:rPr lang="pl-PL" smtClean="0"/>
@@ -5957,7 +6437,7 @@
             <a:fld id="{359484F7-7C7A-4895-B82F-27C098609AFF}" type="datetime1">
               <a:rPr lang="pl-PL" smtClean="0"/>
               <a:pPr/>
-              <a:t>2013-07-14</a:t>
+              <a:t>2013-07-28</a:t>
             </a:fld>
             <a:r>
               <a:rPr lang="pl-PL" smtClean="0"/>
@@ -6453,7 +6933,7 @@
             <a:fld id="{359484F7-7C7A-4895-B82F-27C098609AFF}" type="datetime1">
               <a:rPr lang="pl-PL" smtClean="0"/>
               <a:pPr/>
-              <a:t>2013-07-14</a:t>
+              <a:t>2013-07-28</a:t>
             </a:fld>
             <a:r>
               <a:rPr lang="pl-PL" smtClean="0"/>
@@ -6518,7 +6998,7 @@
             <a:fld id="{359484F7-7C7A-4895-B82F-27C098609AFF}" type="datetime1">
               <a:rPr lang="pl-PL" smtClean="0"/>
               <a:pPr/>
-              <a:t>2013-07-14</a:t>
+              <a:t>2013-07-28</a:t>
             </a:fld>
             <a:r>
               <a:rPr lang="pl-PL" smtClean="0"/>
@@ -6572,68 +7052,51 @@
             </a:pPr>
             <a:r>
               <a:rPr lang="pl-PL" dirty="0" smtClean="0"/>
-              <a:t>Funkcje jako obywatele pierwszej kategorii</a:t>
-            </a:r>
-          </a:p>
-          <a:p>
-            <a:r>
-              <a:rPr lang="pl-PL" dirty="0" smtClean="0"/>
-              <a:t>W Scali funkcja również jest obiektem, który można:</a:t>
-            </a:r>
-          </a:p>
-          <a:p>
-            <a:pPr lvl="1"/>
-            <a:r>
-              <a:rPr lang="pl-PL" dirty="0" smtClean="0"/>
-              <a:t>Przekazywać jako argument innej funkcji</a:t>
-            </a:r>
-          </a:p>
-          <a:p>
-            <a:pPr lvl="1"/>
-            <a:r>
-              <a:rPr lang="pl-PL" dirty="0" smtClean="0"/>
-              <a:t>Zwracać go jako wynik funkcji</a:t>
-            </a:r>
-          </a:p>
-          <a:p>
-            <a:pPr lvl="1"/>
-            <a:r>
-              <a:rPr lang="pl-PL" dirty="0" smtClean="0"/>
-              <a:t>Zapisywać jako zmienna lokalna/obiektu</a:t>
-            </a:r>
-          </a:p>
-          <a:p>
-            <a:pPr lvl="1"/>
-            <a:r>
-              <a:rPr lang="pl-PL" dirty="0" smtClean="0"/>
-              <a:t>Itp.</a:t>
-            </a:r>
-          </a:p>
-          <a:p>
-            <a:r>
-              <a:rPr lang="pl-PL" dirty="0" smtClean="0"/>
-              <a:t>Funkcja jest typu </a:t>
-            </a:r>
-            <a:r>
-              <a:rPr lang="pl-PL" dirty="0" smtClean="0">
-                <a:latin typeface="Consolas" pitchFamily="49" charset="0"/>
-                <a:cs typeface="Consolas" pitchFamily="49" charset="0"/>
-              </a:rPr>
-              <a:t>Function1&lt;T1, R&gt;, Function2&lt;T1, T2, R&gt;, … FunctionN&lt;T1, …, TN, R&gt;</a:t>
-            </a:r>
-          </a:p>
-          <a:p>
-            <a:r>
-              <a:rPr lang="pl-PL" dirty="0" smtClean="0"/>
-              <a:t>Uproszczone funkcje anonimowe</a:t>
-            </a:r>
-          </a:p>
-          <a:p>
+              <a:t>Struktura plików</a:t>
+            </a:r>
+          </a:p>
+          <a:p>
+            <a:r>
+              <a:rPr lang="pl-PL" dirty="0" smtClean="0"/>
+              <a:t>Wiele publicznych klas na plik</a:t>
+            </a:r>
+          </a:p>
+          <a:p>
+            <a:r>
+              <a:rPr lang="pl-PL" dirty="0" smtClean="0"/>
+              <a:t>Wiele importów z jednej paczki w jednej linii</a:t>
+            </a:r>
+          </a:p>
+          <a:p>
+            <a:r>
+              <a:rPr lang="pl-PL" dirty="0" smtClean="0"/>
+              <a:t>Można tworzyć </a:t>
+            </a:r>
             <a:r>
               <a:rPr lang="pl-PL" dirty="0" err="1" smtClean="0"/>
-              <a:t>Currying</a:t>
-            </a:r>
-            <a:endParaRPr lang="pl-PL" dirty="0"/>
+              <a:t>aliasy</a:t>
+            </a:r>
+            <a:r>
+              <a:rPr lang="pl-PL" dirty="0" smtClean="0"/>
+              <a:t> dla importów</a:t>
+            </a:r>
+          </a:p>
+          <a:p>
+            <a:r>
+              <a:rPr lang="pl-PL" dirty="0" smtClean="0"/>
+              <a:t>W modyfikatorze dostępu można podać zakres widoczności dla </a:t>
+            </a:r>
+            <a:r>
+              <a:rPr lang="pl-PL" dirty="0" smtClean="0"/>
+              <a:t>paczki</a:t>
+            </a:r>
+          </a:p>
+          <a:p>
+            <a:r>
+              <a:rPr lang="pl-PL" dirty="0" smtClean="0"/>
+              <a:t>Importy o ograniczonej widoczności</a:t>
+            </a:r>
+            <a:endParaRPr lang="pl-PL" dirty="0" smtClean="0"/>
           </a:p>
         </p:txBody>
       </p:sp>
@@ -6680,7 +7143,7 @@
             <a:fld id="{359484F7-7C7A-4895-B82F-27C098609AFF}" type="datetime1">
               <a:rPr lang="pl-PL" smtClean="0"/>
               <a:pPr/>
-              <a:t>2013-07-14</a:t>
+              <a:t>2013-07-28</a:t>
             </a:fld>
             <a:r>
               <a:rPr lang="pl-PL" smtClean="0"/>
@@ -6716,7 +7179,7 @@
       </p:sp>
       <p:sp>
         <p:nvSpPr>
-          <p:cNvPr id="4" name="Symbol zastępczy zawartości 3"/>
+          <p:cNvPr id="9" name="Symbol zastępczy zawartości 8"/>
           <p:cNvSpPr>
             <a:spLocks noGrp="1"/>
           </p:cNvSpPr>
@@ -6733,30 +7196,68 @@
               <a:buNone/>
             </a:pPr>
             <a:r>
-              <a:rPr lang="pl-PL" dirty="0" smtClean="0"/>
-              <a:t>Struktura plików</a:t>
-            </a:r>
-          </a:p>
-          <a:p>
-            <a:r>
-              <a:rPr lang="pl-PL" dirty="0" smtClean="0"/>
-              <a:t>Wiele publicznych klas na plik</a:t>
-            </a:r>
-          </a:p>
-          <a:p>
-            <a:r>
-              <a:rPr lang="pl-PL" dirty="0" smtClean="0"/>
-              <a:t>Dosłodzone importy</a:t>
-            </a:r>
-          </a:p>
-          <a:p>
-            <a:r>
-              <a:rPr lang="pl-PL" dirty="0" smtClean="0"/>
-              <a:t>Dosłodzone modyfikatory dostępu</a:t>
-            </a:r>
-          </a:p>
-          <a:p>
-            <a:endParaRPr lang="pl-PL" dirty="0"/>
+              <a:rPr lang="pl-PL" dirty="0" err="1" smtClean="0"/>
+              <a:t>Case</a:t>
+            </a:r>
+            <a:r>
+              <a:rPr lang="pl-PL" dirty="0" smtClean="0"/>
+              <a:t> </a:t>
+            </a:r>
+            <a:r>
+              <a:rPr lang="pl-PL" dirty="0" err="1" smtClean="0"/>
+              <a:t>classes</a:t>
+            </a:r>
+            <a:endParaRPr lang="pl-PL" dirty="0" smtClean="0"/>
+          </a:p>
+          <a:p>
+            <a:r>
+              <a:rPr lang="pl-PL" dirty="0" smtClean="0"/>
+              <a:t>getter/</a:t>
+            </a:r>
+            <a:r>
+              <a:rPr lang="pl-PL" dirty="0" err="1" smtClean="0"/>
+              <a:t>setter</a:t>
+            </a:r>
+            <a:r>
+              <a:rPr lang="pl-PL" dirty="0" smtClean="0"/>
+              <a:t> (z @</a:t>
+            </a:r>
+            <a:r>
+              <a:rPr lang="pl-PL" dirty="0" err="1" smtClean="0"/>
+              <a:t>BeanProperty</a:t>
+            </a:r>
+            <a:r>
+              <a:rPr lang="pl-PL" dirty="0" smtClean="0"/>
+              <a:t>)</a:t>
+            </a:r>
+          </a:p>
+          <a:p>
+            <a:r>
+              <a:rPr lang="pl-PL" dirty="0" err="1" smtClean="0"/>
+              <a:t>toString</a:t>
+            </a:r>
+            <a:endParaRPr lang="pl-PL" dirty="0" smtClean="0"/>
+          </a:p>
+          <a:p>
+            <a:r>
+              <a:rPr lang="pl-PL" dirty="0" err="1" smtClean="0"/>
+              <a:t>equals</a:t>
+            </a:r>
+            <a:endParaRPr lang="pl-PL" dirty="0" smtClean="0"/>
+          </a:p>
+          <a:p>
+            <a:r>
+              <a:rPr lang="pl-PL" dirty="0" err="1" smtClean="0"/>
+              <a:t>hashCode</a:t>
+            </a:r>
+            <a:endParaRPr lang="pl-PL" dirty="0" smtClean="0"/>
+          </a:p>
+          <a:p>
+            <a:r>
+              <a:rPr lang="pl-PL" dirty="0" err="1" smtClean="0"/>
+              <a:t>copy</a:t>
+            </a:r>
+            <a:endParaRPr lang="pl-PL" dirty="0" smtClean="0"/>
           </a:p>
         </p:txBody>
       </p:sp>
@@ -6803,7 +7304,7 @@
             <a:fld id="{359484F7-7C7A-4895-B82F-27C098609AFF}" type="datetime1">
               <a:rPr lang="pl-PL" smtClean="0"/>
               <a:pPr/>
-              <a:t>2013-07-14</a:t>
+              <a:t>2013-07-28</a:t>
             </a:fld>
             <a:r>
               <a:rPr lang="pl-PL" smtClean="0"/>
@@ -6839,7 +7340,7 @@
       </p:sp>
       <p:sp>
         <p:nvSpPr>
-          <p:cNvPr id="9" name="Symbol zastępczy zawartości 8"/>
+          <p:cNvPr id="4" name="Symbol zastępczy zawartości 3"/>
           <p:cNvSpPr>
             <a:spLocks noGrp="1"/>
           </p:cNvSpPr>
@@ -6857,7 +7358,7 @@
             </a:pPr>
             <a:r>
               <a:rPr lang="pl-PL" dirty="0" err="1" smtClean="0"/>
-              <a:t>Case</a:t>
+              <a:t>Pattern</a:t>
             </a:r>
             <a:r>
               <a:rPr lang="pl-PL" dirty="0" smtClean="0"/>
@@ -6865,59 +7366,37 @@
             </a:r>
             <a:r>
               <a:rPr lang="pl-PL" dirty="0" err="1" smtClean="0"/>
-              <a:t>classes</a:t>
+              <a:t>matching</a:t>
             </a:r>
             <a:endParaRPr lang="pl-PL" dirty="0" smtClean="0"/>
           </a:p>
           <a:p>
             <a:r>
-              <a:rPr lang="pl-PL" dirty="0" smtClean="0"/>
-              <a:t>getter/</a:t>
-            </a:r>
-            <a:r>
               <a:rPr lang="pl-PL" dirty="0" err="1" smtClean="0"/>
-              <a:t>setter</a:t>
-            </a:r>
-            <a:r>
-              <a:rPr lang="pl-PL" dirty="0" smtClean="0"/>
-              <a:t> (z @</a:t>
-            </a:r>
+              <a:t>Switch</a:t>
+            </a:r>
+            <a:r>
+              <a:rPr lang="pl-PL" dirty="0" smtClean="0"/>
+              <a:t> na sterydach</a:t>
+            </a:r>
+          </a:p>
+          <a:p>
             <a:r>
               <a:rPr lang="pl-PL" dirty="0" err="1" smtClean="0"/>
-              <a:t>BeanProperty</a:t>
-            </a:r>
-            <a:r>
-              <a:rPr lang="pl-PL" dirty="0" smtClean="0"/>
-              <a:t>)</a:t>
-            </a:r>
-          </a:p>
-          <a:p>
+              <a:t>Killer</a:t>
+            </a:r>
+            <a:r>
+              <a:rPr lang="pl-PL" dirty="0" smtClean="0"/>
+              <a:t> </a:t>
+            </a:r>
             <a:r>
               <a:rPr lang="pl-PL" dirty="0" err="1" smtClean="0"/>
-              <a:t>toString</a:t>
-            </a:r>
-            <a:endParaRPr lang="pl-PL" dirty="0" smtClean="0"/>
-          </a:p>
-          <a:p>
-            <a:r>
-              <a:rPr lang="pl-PL" dirty="0" err="1" smtClean="0"/>
-              <a:t>equals</a:t>
-            </a:r>
-            <a:endParaRPr lang="pl-PL" dirty="0" smtClean="0"/>
-          </a:p>
-          <a:p>
-            <a:r>
-              <a:rPr lang="pl-PL" dirty="0" err="1" smtClean="0"/>
-              <a:t>hashCode</a:t>
-            </a:r>
-            <a:endParaRPr lang="pl-PL" dirty="0" smtClean="0"/>
-          </a:p>
-          <a:p>
-            <a:r>
-              <a:rPr lang="pl-PL" dirty="0" err="1" smtClean="0"/>
-              <a:t>copy</a:t>
-            </a:r>
-            <a:endParaRPr lang="pl-PL" dirty="0" smtClean="0"/>
+              <a:t>feature</a:t>
+            </a:r>
+            <a:r>
+              <a:rPr lang="pl-PL" dirty="0" smtClean="0"/>
+              <a:t>, a nie wygląda</a:t>
+            </a:r>
           </a:p>
         </p:txBody>
       </p:sp>
@@ -6964,7 +7443,7 @@
             <a:fld id="{359484F7-7C7A-4895-B82F-27C098609AFF}" type="datetime1">
               <a:rPr lang="pl-PL" smtClean="0"/>
               <a:pPr/>
-              <a:t>2013-07-14</a:t>
+              <a:t>2013-07-28</a:t>
             </a:fld>
             <a:r>
               <a:rPr lang="pl-PL" smtClean="0"/>
@@ -7017,8 +7496,21 @@
               <a:buNone/>
             </a:pPr>
             <a:r>
+              <a:rPr lang="pl-PL" dirty="0" smtClean="0"/>
+              <a:t>Rozszerzenia paradygmatu obiektowego</a:t>
+            </a:r>
+          </a:p>
+          <a:p>
+            <a:r>
               <a:rPr lang="pl-PL" dirty="0" err="1" smtClean="0"/>
-              <a:t>Pattern</a:t>
+              <a:t>Traits</a:t>
+            </a:r>
+            <a:endParaRPr lang="pl-PL" dirty="0" smtClean="0"/>
+          </a:p>
+          <a:p>
+            <a:r>
+              <a:rPr lang="pl-PL" dirty="0" err="1" smtClean="0"/>
+              <a:t>Sealed</a:t>
             </a:r>
             <a:r>
               <a:rPr lang="pl-PL" dirty="0" smtClean="0"/>
@@ -7026,37 +7518,44 @@
             </a:r>
             <a:r>
               <a:rPr lang="pl-PL" dirty="0" err="1" smtClean="0"/>
-              <a:t>matching</a:t>
+              <a:t>traits</a:t>
             </a:r>
             <a:endParaRPr lang="pl-PL" dirty="0" smtClean="0"/>
           </a:p>
           <a:p>
             <a:r>
               <a:rPr lang="pl-PL" dirty="0" err="1" smtClean="0"/>
-              <a:t>Switch</a:t>
-            </a:r>
-            <a:r>
-              <a:rPr lang="pl-PL" dirty="0" smtClean="0"/>
-              <a:t> na sterydach</a:t>
-            </a:r>
-          </a:p>
-          <a:p>
+              <a:t>Companion</a:t>
+            </a:r>
+            <a:r>
+              <a:rPr lang="pl-PL" dirty="0" smtClean="0"/>
+              <a:t> </a:t>
+            </a:r>
             <a:r>
               <a:rPr lang="pl-PL" dirty="0" err="1" smtClean="0"/>
-              <a:t>Killer</a:t>
-            </a:r>
-            <a:r>
-              <a:rPr lang="pl-PL" dirty="0" smtClean="0"/>
-              <a:t> </a:t>
-            </a:r>
+              <a:t>objects</a:t>
+            </a:r>
+            <a:endParaRPr lang="pl-PL" dirty="0" smtClean="0"/>
+          </a:p>
+          <a:p>
             <a:r>
               <a:rPr lang="pl-PL" dirty="0" err="1" smtClean="0"/>
-              <a:t>feature</a:t>
-            </a:r>
-            <a:r>
-              <a:rPr lang="pl-PL" dirty="0" smtClean="0"/>
-              <a:t>, a nie wygląda</a:t>
-            </a:r>
+              <a:t>Aliasy</a:t>
+            </a:r>
+            <a:r>
+              <a:rPr lang="pl-PL" dirty="0" smtClean="0"/>
+              <a:t> dla typów</a:t>
+            </a:r>
+          </a:p>
+          <a:p>
+            <a:r>
+              <a:rPr lang="pl-PL" dirty="0" err="1" smtClean="0"/>
+              <a:t>Singleton</a:t>
+            </a:r>
+            <a:endParaRPr lang="pl-PL" dirty="0" smtClean="0"/>
+          </a:p>
+          <a:p>
+            <a:endParaRPr lang="pl-PL" dirty="0"/>
           </a:p>
         </p:txBody>
       </p:sp>
@@ -7103,7 +7602,7 @@
             <a:fld id="{359484F7-7C7A-4895-B82F-27C098609AFF}" type="datetime1">
               <a:rPr lang="pl-PL" smtClean="0"/>
               <a:pPr/>
-              <a:t>2013-07-14</a:t>
+              <a:t>2013-07-28</a:t>
             </a:fld>
             <a:r>
               <a:rPr lang="pl-PL" smtClean="0"/>
@@ -7236,7 +7735,7 @@
             <a:fld id="{359484F7-7C7A-4895-B82F-27C098609AFF}" type="datetime1">
               <a:rPr lang="pl-PL" smtClean="0"/>
               <a:pPr/>
-              <a:t>2013-07-14</a:t>
+              <a:t>2013-07-28</a:t>
             </a:fld>
             <a:r>
               <a:rPr lang="pl-PL" smtClean="0"/>
@@ -7289,21 +7788,71 @@
               <a:buNone/>
             </a:pPr>
             <a:r>
+              <a:rPr lang="pl-PL" dirty="0" smtClean="0"/>
+              <a:t>Funkcje jako obywatele pierwszej kategorii</a:t>
+            </a:r>
+          </a:p>
+          <a:p>
+            <a:r>
+              <a:rPr lang="pl-PL" dirty="0" smtClean="0"/>
+              <a:t>W Scali funkcja również jest obiektem, który można:</a:t>
+            </a:r>
+          </a:p>
+          <a:p>
+            <a:pPr lvl="1"/>
+            <a:r>
+              <a:rPr lang="pl-PL" dirty="0" smtClean="0"/>
+              <a:t>Przekazywać jako argument innej funkcji</a:t>
+            </a:r>
+          </a:p>
+          <a:p>
+            <a:pPr lvl="1"/>
+            <a:r>
+              <a:rPr lang="pl-PL" dirty="0" smtClean="0"/>
+              <a:t>Zwracać go jako wynik funkcji</a:t>
+            </a:r>
+          </a:p>
+          <a:p>
+            <a:pPr lvl="1"/>
+            <a:r>
+              <a:rPr lang="pl-PL" dirty="0" smtClean="0"/>
+              <a:t>Zapisywać jako zmienna lokalna/obiektu</a:t>
+            </a:r>
+          </a:p>
+          <a:p>
+            <a:pPr lvl="1"/>
+            <a:r>
+              <a:rPr lang="pl-PL" dirty="0" smtClean="0"/>
+              <a:t>Itp.</a:t>
+            </a:r>
+          </a:p>
+          <a:p>
+            <a:r>
+              <a:rPr lang="pl-PL" dirty="0" smtClean="0"/>
+              <a:t>Funkcja j</a:t>
+            </a:r>
+            <a:r>
+              <a:rPr lang="pl-PL" dirty="0" smtClean="0"/>
+              <a:t>est typu </a:t>
+            </a:r>
+            <a:r>
+              <a:rPr lang="pl-PL" dirty="0" smtClean="0">
+                <a:latin typeface="Consolas" pitchFamily="49" charset="0"/>
+                <a:cs typeface="Consolas" pitchFamily="49" charset="0"/>
+              </a:rPr>
+              <a:t>Function1&lt;T1, R&gt;, Function2&lt;T1, T2, R&gt;, … FunctionN&lt;T1, …, TN, R&gt;</a:t>
+            </a:r>
+          </a:p>
+          <a:p>
+            <a:r>
+              <a:rPr lang="pl-PL" dirty="0" smtClean="0"/>
+              <a:t>Uproszczone funkcje anonimowe</a:t>
+            </a:r>
+          </a:p>
+          <a:p>
+            <a:r>
               <a:rPr lang="pl-PL" dirty="0" err="1" smtClean="0"/>
-              <a:t>Implicits</a:t>
-            </a:r>
-            <a:endParaRPr lang="pl-PL" dirty="0" smtClean="0"/>
-          </a:p>
-          <a:p>
-            <a:r>
-              <a:rPr lang="pl-PL" dirty="0" smtClean="0"/>
-              <a:t>Poprawianie klas, których nie możemy zmienić lub nie chcemy rozszerzać</a:t>
-            </a:r>
-          </a:p>
-          <a:p>
-            <a:r>
-              <a:rPr lang="pl-PL" dirty="0" smtClean="0"/>
-              <a:t>Ukrywanie często wymaganych argumentów metod</a:t>
+              <a:t>Currying</a:t>
             </a:r>
             <a:endParaRPr lang="pl-PL" dirty="0"/>
           </a:p>
@@ -7352,7 +7901,7 @@
             <a:fld id="{359484F7-7C7A-4895-B82F-27C098609AFF}" type="datetime1">
               <a:rPr lang="pl-PL" smtClean="0"/>
               <a:pPr/>
-              <a:t>2013-07-14</a:t>
+              <a:t>2013-07-28</a:t>
             </a:fld>
             <a:r>
               <a:rPr lang="pl-PL" smtClean="0"/>
@@ -7405,69 +7954,22 @@
               <a:buNone/>
             </a:pPr>
             <a:r>
-              <a:rPr lang="pl-PL" dirty="0" smtClean="0"/>
-              <a:t>Rozszerzenia paradygmatu obiektowego</a:t>
-            </a:r>
-          </a:p>
-          <a:p>
-            <a:r>
               <a:rPr lang="pl-PL" dirty="0" err="1" smtClean="0"/>
-              <a:t>Traits</a:t>
+              <a:t>Implicits</a:t>
             </a:r>
             <a:endParaRPr lang="pl-PL" dirty="0" smtClean="0"/>
           </a:p>
           <a:p>
             <a:r>
-              <a:rPr lang="pl-PL" dirty="0" err="1" smtClean="0"/>
-              <a:t>Sealed</a:t>
-            </a:r>
-            <a:r>
-              <a:rPr lang="pl-PL" dirty="0" smtClean="0"/>
-              <a:t> </a:t>
-            </a:r>
-            <a:r>
-              <a:rPr lang="pl-PL" dirty="0" err="1" smtClean="0"/>
-              <a:t>traits</a:t>
-            </a:r>
-            <a:endParaRPr lang="pl-PL" dirty="0" smtClean="0"/>
-          </a:p>
-          <a:p>
-            <a:r>
-              <a:rPr lang="pl-PL" dirty="0" err="1" smtClean="0"/>
-              <a:t>Companion</a:t>
-            </a:r>
-            <a:r>
-              <a:rPr lang="pl-PL" dirty="0" smtClean="0"/>
-              <a:t> </a:t>
-            </a:r>
-            <a:r>
-              <a:rPr lang="pl-PL" dirty="0" err="1" smtClean="0"/>
-              <a:t>objects</a:t>
-            </a:r>
-            <a:endParaRPr lang="pl-PL" dirty="0" smtClean="0"/>
-          </a:p>
-          <a:p>
-            <a:r>
-              <a:rPr lang="pl-PL" dirty="0" err="1" smtClean="0"/>
-              <a:t>Aliasy</a:t>
-            </a:r>
-            <a:r>
-              <a:rPr lang="pl-PL" dirty="0" smtClean="0"/>
-              <a:t> dla </a:t>
-            </a:r>
-            <a:r>
-              <a:rPr lang="pl-PL" dirty="0" smtClean="0"/>
-              <a:t>typów</a:t>
-            </a:r>
-          </a:p>
-          <a:p>
-            <a:r>
-              <a:rPr lang="pl-PL" dirty="0" err="1" smtClean="0"/>
-              <a:t>Singleton</a:t>
-            </a:r>
-            <a:endParaRPr lang="pl-PL" dirty="0" smtClean="0"/>
-          </a:p>
-          <a:p>
+              <a:rPr lang="pl-PL" dirty="0" smtClean="0"/>
+              <a:t>Poprawianie klas, których nie możemy zmienić lub nie chcemy rozszerzać</a:t>
+            </a:r>
+          </a:p>
+          <a:p>
+            <a:r>
+              <a:rPr lang="pl-PL" dirty="0" smtClean="0"/>
+              <a:t>Ukrywanie często wymaganych argumentów metod</a:t>
+            </a:r>
             <a:endParaRPr lang="pl-PL" dirty="0"/>
           </a:p>
         </p:txBody>
@@ -7515,7 +8017,7 @@
             <a:fld id="{359484F7-7C7A-4895-B82F-27C098609AFF}" type="datetime1">
               <a:rPr lang="pl-PL" smtClean="0"/>
               <a:pPr/>
-              <a:t>2013-07-14</a:t>
+              <a:t>2013-07-28</a:t>
             </a:fld>
             <a:r>
               <a:rPr lang="pl-PL" smtClean="0"/>
@@ -7564,13 +8066,153 @@
           <a:bodyPr/>
           <a:lstStyle/>
           <a:p>
+            <a:pPr>
+              <a:buNone/>
+            </a:pPr>
             <a:r>
               <a:rPr lang="pl-PL" dirty="0" smtClean="0"/>
               <a:t>Biblioteka standardowa</a:t>
             </a:r>
           </a:p>
           <a:p>
+            <a:r>
+              <a:rPr lang="pl-PL" dirty="0" err="1" smtClean="0"/>
+              <a:t>Kolecje</a:t>
+            </a:r>
+            <a:endParaRPr lang="pl-PL" dirty="0" smtClean="0"/>
+          </a:p>
+          <a:p>
+            <a:pPr lvl="1"/>
+            <a:r>
+              <a:rPr lang="pl-PL" dirty="0" err="1" smtClean="0"/>
+              <a:t>find</a:t>
+            </a:r>
+            <a:r>
+              <a:rPr lang="pl-PL" dirty="0" smtClean="0"/>
+              <a:t>, </a:t>
+            </a:r>
+            <a:r>
+              <a:rPr lang="pl-PL" dirty="0" err="1" smtClean="0"/>
+              <a:t>filter</a:t>
+            </a:r>
+            <a:r>
+              <a:rPr lang="pl-PL" dirty="0" smtClean="0"/>
+              <a:t>, map, </a:t>
+            </a:r>
+            <a:r>
+              <a:rPr lang="pl-PL" dirty="0" err="1" smtClean="0"/>
+              <a:t>flatMap</a:t>
+            </a:r>
+            <a:r>
+              <a:rPr lang="pl-PL" dirty="0" smtClean="0"/>
+              <a:t>, </a:t>
+            </a:r>
+            <a:r>
+              <a:rPr lang="pl-PL" dirty="0" err="1" smtClean="0"/>
+              <a:t>reverse</a:t>
+            </a:r>
+            <a:r>
+              <a:rPr lang="pl-PL" dirty="0" smtClean="0"/>
+              <a:t>, </a:t>
+            </a:r>
+            <a:r>
+              <a:rPr lang="pl-PL" dirty="0" err="1" smtClean="0"/>
+              <a:t>sortBy</a:t>
+            </a:r>
+            <a:r>
+              <a:rPr lang="pl-PL" dirty="0" smtClean="0"/>
+              <a:t>, </a:t>
+            </a:r>
+            <a:r>
+              <a:rPr lang="pl-PL" dirty="0" err="1" smtClean="0"/>
+              <a:t>take</a:t>
+            </a:r>
+            <a:r>
+              <a:rPr lang="pl-PL" dirty="0" smtClean="0"/>
+              <a:t>, </a:t>
+            </a:r>
+            <a:r>
+              <a:rPr lang="pl-PL" dirty="0" err="1" smtClean="0"/>
+              <a:t>takeWhile</a:t>
+            </a:r>
+            <a:r>
+              <a:rPr lang="pl-PL" dirty="0" smtClean="0"/>
+              <a:t>, drop, </a:t>
+            </a:r>
+            <a:r>
+              <a:rPr lang="pl-PL" dirty="0" err="1" smtClean="0"/>
+              <a:t>dropUntil</a:t>
+            </a:r>
+            <a:endParaRPr lang="pl-PL" dirty="0" smtClean="0"/>
+          </a:p>
+          <a:p>
+            <a:r>
+              <a:rPr lang="pl-PL" dirty="0" err="1" smtClean="0"/>
+              <a:t>RichString</a:t>
+            </a:r>
+            <a:r>
+              <a:rPr lang="pl-PL" dirty="0" smtClean="0"/>
+              <a:t>, </a:t>
+            </a:r>
+            <a:r>
+              <a:rPr lang="pl-PL" dirty="0" err="1" smtClean="0"/>
+              <a:t>RichInt</a:t>
+            </a:r>
+            <a:endParaRPr lang="pl-PL" dirty="0" smtClean="0"/>
+          </a:p>
+          <a:p>
+            <a:r>
+              <a:rPr lang="pl-PL" dirty="0" err="1" smtClean="0"/>
+              <a:t>Option</a:t>
+            </a:r>
+            <a:endParaRPr lang="pl-PL" dirty="0" smtClean="0"/>
+          </a:p>
+          <a:p>
+            <a:r>
+              <a:rPr lang="pl-PL" dirty="0" err="1" smtClean="0"/>
+              <a:t>Stream</a:t>
+            </a:r>
+            <a:endParaRPr lang="pl-PL" dirty="0" smtClean="0"/>
+          </a:p>
+          <a:p>
+            <a:r>
+              <a:rPr lang="pl-PL" dirty="0" err="1" smtClean="0"/>
+              <a:t>Future</a:t>
+            </a:r>
+            <a:endParaRPr lang="pl-PL" dirty="0" smtClean="0"/>
+          </a:p>
+          <a:p>
+            <a:r>
+              <a:rPr lang="pl-PL" dirty="0" err="1" smtClean="0"/>
+              <a:t>Either</a:t>
+            </a:r>
+            <a:endParaRPr lang="pl-PL" dirty="0" smtClean="0"/>
+          </a:p>
+          <a:p>
+            <a:r>
+              <a:rPr lang="pl-PL" dirty="0" err="1" smtClean="0"/>
+              <a:t>Parallel</a:t>
+            </a:r>
+            <a:r>
+              <a:rPr lang="pl-PL" dirty="0" smtClean="0"/>
+              <a:t> </a:t>
+            </a:r>
+            <a:r>
+              <a:rPr lang="pl-PL" dirty="0" err="1" smtClean="0"/>
+              <a:t>collections</a:t>
+            </a:r>
             <a:endParaRPr lang="pl-PL" dirty="0"/>
+          </a:p>
+          <a:p>
+            <a:r>
+              <a:rPr lang="pl-PL" dirty="0" smtClean="0"/>
+              <a:t>Java </a:t>
+            </a:r>
+            <a:r>
+              <a:rPr lang="pl-PL" dirty="0" err="1" smtClean="0"/>
+              <a:t>conversions</a:t>
+            </a:r>
+            <a:endParaRPr lang="pl-PL" dirty="0" smtClean="0"/>
           </a:p>
         </p:txBody>
       </p:sp>
@@ -7617,7 +8259,7 @@
             <a:fld id="{359484F7-7C7A-4895-B82F-27C098609AFF}" type="datetime1">
               <a:rPr lang="pl-PL" smtClean="0"/>
               <a:pPr/>
-              <a:t>2013-07-14</a:t>
+              <a:t>2013-07-28</a:t>
             </a:fld>
             <a:r>
               <a:rPr lang="pl-PL" smtClean="0"/>
@@ -7671,50 +8313,78 @@
             </a:pPr>
             <a:r>
               <a:rPr lang="pl-PL" dirty="0" smtClean="0"/>
-              <a:t>MATERIAŁY</a:t>
-            </a:r>
-          </a:p>
-          <a:p>
-            <a:r>
-              <a:rPr lang="pl-PL" sz="2000" dirty="0" err="1" smtClean="0"/>
-              <a:t>git@vm-opensource-git.fp.lan:futures-training</a:t>
-            </a:r>
-            <a:r>
-              <a:rPr lang="pl-PL" sz="2000" dirty="0" smtClean="0"/>
-              <a:t>/</a:t>
-            </a:r>
-            <a:r>
-              <a:rPr lang="pl-PL" sz="2000" dirty="0" err="1" smtClean="0"/>
-              <a:t>futures-training.git</a:t>
-            </a:r>
-            <a:endParaRPr lang="pl-PL" sz="2000" dirty="0" smtClean="0"/>
-          </a:p>
-          <a:p>
-            <a:pPr>
-              <a:buNone/>
-            </a:pPr>
-            <a:r>
-              <a:rPr lang="pl-PL" dirty="0" smtClean="0"/>
-              <a:t>ŹRÓDŁA</a:t>
-            </a:r>
-          </a:p>
-          <a:p>
-            <a:r>
-              <a:rPr lang="pl-PL" dirty="0" smtClean="0">
-                <a:hlinkClick r:id="rId2"/>
-              </a:rPr>
-              <a:t>http://scalaz.github.io/scalaz/scalaz-2.9.1-6.0.2/doc.sxr/scalaz/example/ExampleApplicative.scala.html</a:t>
+              <a:t>O czym nie powiedziałem</a:t>
+            </a:r>
+          </a:p>
+          <a:p>
+            <a:r>
+              <a:rPr lang="pl-PL" dirty="0" smtClean="0"/>
+              <a:t>Operatory</a:t>
+            </a:r>
+          </a:p>
+          <a:p>
+            <a:r>
+              <a:rPr lang="pl-PL" dirty="0" smtClean="0"/>
+              <a:t>Makra</a:t>
+            </a:r>
+          </a:p>
+          <a:p>
+            <a:r>
+              <a:rPr lang="pl-PL" dirty="0" smtClean="0"/>
+              <a:t>Leniwość</a:t>
+            </a:r>
+          </a:p>
+          <a:p>
+            <a:r>
+              <a:rPr lang="pl-PL" dirty="0" err="1" smtClean="0"/>
+              <a:t>Option</a:t>
+            </a:r>
+            <a:r>
+              <a:rPr lang="pl-PL" dirty="0" smtClean="0"/>
+              <a:t>[T]</a:t>
             </a:r>
             <a:endParaRPr lang="pl-PL" dirty="0" smtClean="0"/>
           </a:p>
           <a:p>
             <a:r>
-              <a:rPr lang="pl-PL" dirty="0" smtClean="0">
-                <a:hlinkClick r:id="rId3"/>
-              </a:rPr>
-              <a:t>http://jazzy.id.au/default/2012/10/16/benchmarking_scala_against_java.html</a:t>
-            </a:r>
-            <a:endParaRPr lang="pl-PL" dirty="0"/>
+              <a:rPr lang="pl-PL" dirty="0" smtClean="0"/>
+              <a:t>Wsparcie dla niezmienności</a:t>
+            </a:r>
+          </a:p>
+          <a:p>
+            <a:r>
+              <a:rPr lang="pl-PL" dirty="0" smtClean="0"/>
+              <a:t>Monady</a:t>
+            </a:r>
+          </a:p>
+          <a:p>
+            <a:r>
+              <a:rPr lang="pl-PL" dirty="0" err="1" smtClean="0"/>
+              <a:t>Cake</a:t>
+            </a:r>
+            <a:r>
+              <a:rPr lang="pl-PL" dirty="0" smtClean="0"/>
+              <a:t> </a:t>
+            </a:r>
+            <a:r>
+              <a:rPr lang="pl-PL" dirty="0" err="1" smtClean="0"/>
+              <a:t>Pattern</a:t>
+            </a:r>
+            <a:endParaRPr lang="pl-PL" dirty="0" smtClean="0"/>
+          </a:p>
+          <a:p>
+            <a:r>
+              <a:rPr lang="pl-PL" dirty="0" err="1" smtClean="0"/>
+              <a:t>Call-by-name</a:t>
+            </a:r>
+            <a:endParaRPr lang="pl-PL" dirty="0" smtClean="0"/>
+          </a:p>
+          <a:p>
+            <a:r>
+              <a:rPr lang="pl-PL" dirty="0" smtClean="0"/>
+              <a:t>Na bank coś jeszcze</a:t>
+            </a:r>
+            <a:endParaRPr lang="pl-PL" dirty="0" smtClean="0"/>
           </a:p>
         </p:txBody>
       </p:sp>
@@ -7723,13 +8393,6 @@
   <p:clrMapOvr>
     <a:masterClrMapping/>
   </p:clrMapOvr>
-  <p:timing>
-    <p:tnLst>
-      <p:par>
-        <p:cTn id="1" dur="indefinite" restart="never" nodeType="tmRoot"/>
-      </p:par>
-    </p:tnLst>
-  </p:timing>
 </p:sld>
 </file>
 
@@ -7768,7 +8431,7 @@
             <a:fld id="{359484F7-7C7A-4895-B82F-27C098609AFF}" type="datetime1">
               <a:rPr lang="pl-PL" smtClean="0"/>
               <a:pPr/>
-              <a:t>2013-07-14</a:t>
+              <a:t>2013-07-28</a:t>
             </a:fld>
             <a:r>
               <a:rPr lang="pl-PL" smtClean="0"/>
@@ -7830,6 +8493,35 @@
               <a:rPr lang="pl-PL" dirty="0" smtClean="0">
                 <a:hlinkClick r:id="rId2"/>
               </a:rPr>
+              <a:t>http://docs.scala-lang.org/</a:t>
+            </a:r>
+            <a:endParaRPr lang="pl-PL" dirty="0" smtClean="0"/>
+          </a:p>
+          <a:p>
+            <a:r>
+              <a:rPr lang="pl-PL" dirty="0" smtClean="0">
+                <a:hlinkClick r:id="rId3"/>
+              </a:rPr>
+              <a:t>http://docs.scala-lang.org/tutorials/scala-for-java-programmers.html</a:t>
+            </a:r>
+            <a:endParaRPr lang="pl-PL" dirty="0" smtClean="0"/>
+          </a:p>
+          <a:p>
+            <a:r>
+              <a:rPr lang="pl-PL" dirty="0" smtClean="0">
+                <a:hlinkClick r:id="rId4"/>
+              </a:rPr>
+              <a:t>http://docs.scala-lang.org/cheatsheets/</a:t>
+            </a:r>
+            <a:endParaRPr lang="pl-PL" dirty="0" smtClean="0">
+              <a:hlinkClick r:id="rId5"/>
+            </a:endParaRPr>
+          </a:p>
+          <a:p>
+            <a:r>
+              <a:rPr lang="pl-PL" dirty="0" smtClean="0">
+                <a:hlinkClick r:id="rId5"/>
+              </a:rPr>
               <a:t>http://www.atomicscala.com/book</a:t>
             </a:r>
             <a:r>
@@ -7841,13 +8533,13 @@
               <a:t>Eckel</a:t>
             </a:r>
             <a:endParaRPr lang="pl-PL" dirty="0" smtClean="0">
-              <a:hlinkClick r:id="rId3"/>
+              <a:hlinkClick r:id="rId6"/>
             </a:endParaRPr>
           </a:p>
           <a:p>
             <a:r>
               <a:rPr lang="pl-PL" dirty="0" smtClean="0">
-                <a:hlinkClick r:id="rId3"/>
+                <a:hlinkClick r:id="rId6"/>
               </a:rPr>
               <a:t>http://twitter.github.io/scala_school/</a:t>
             </a:r>
@@ -7898,7 +8590,7 @@
             <a:fld id="{359484F7-7C7A-4895-B82F-27C098609AFF}" type="datetime1">
               <a:rPr lang="pl-PL" smtClean="0"/>
               <a:pPr/>
-              <a:t>2013-07-14</a:t>
+              <a:t>2013-07-28</a:t>
             </a:fld>
             <a:r>
               <a:rPr lang="pl-PL" smtClean="0"/>
@@ -7958,11 +8650,7 @@
             </a:pPr>
             <a:r>
               <a:rPr lang="pl-PL" sz="4000" dirty="0" smtClean="0"/>
-              <a:t>Materiały i </a:t>
-            </a:r>
-            <a:r>
-              <a:rPr lang="pl-PL" sz="4000" dirty="0" smtClean="0"/>
-              <a:t>prezentacja:</a:t>
+              <a:t>Materiały i prezentacja:</a:t>
             </a:r>
             <a:br>
               <a:rPr lang="pl-PL" sz="4000" dirty="0" smtClean="0"/>
@@ -8030,7 +8718,7 @@
             <a:fld id="{359484F7-7C7A-4895-B82F-27C098609AFF}" type="datetime1">
               <a:rPr lang="pl-PL" smtClean="0"/>
               <a:pPr/>
-              <a:t>2013-07-14</a:t>
+              <a:t>2013-07-28</a:t>
             </a:fld>
             <a:r>
               <a:rPr lang="pl-PL" smtClean="0"/>
@@ -8066,7 +8754,7 @@
       </p:sp>
       <p:sp>
         <p:nvSpPr>
-          <p:cNvPr id="7" name="Symbol zastępczy zawartości 6"/>
+          <p:cNvPr id="4" name="Symbol zastępczy zawartości 3"/>
           <p:cNvSpPr>
             <a:spLocks noGrp="1"/>
           </p:cNvSpPr>
@@ -8079,36 +8767,49 @@
           <a:bodyPr/>
           <a:lstStyle/>
           <a:p>
-            <a:endParaRPr lang="pl-PL"/>
-          </a:p>
-        </p:txBody>
-      </p:sp>
-      <p:pic>
-        <p:nvPicPr>
-          <p:cNvPr id="1026" name="Picture 2" descr="http://thisbugslifedotcom.files.wordpress.com/2013/04/tard-grumpy-cat.jpg"/>
-          <p:cNvPicPr>
-            <a:picLocks noChangeAspect="1" noChangeArrowheads="1"/>
-          </p:cNvPicPr>
-          <p:nvPr/>
-        </p:nvPicPr>
-        <p:blipFill>
-          <a:blip r:embed="rId2" cstate="print"/>
-          <a:srcRect/>
-          <a:stretch>
-            <a:fillRect/>
-          </a:stretch>
-        </p:blipFill>
-        <p:spPr bwMode="auto">
-          <a:xfrm>
-            <a:off x="2483768" y="1844824"/>
-            <a:ext cx="3810000" cy="3810000"/>
-          </a:xfrm>
-          <a:prstGeom prst="rect">
-            <a:avLst/>
-          </a:prstGeom>
-          <a:noFill/>
-        </p:spPr>
-      </p:pic>
+            <a:pPr>
+              <a:buNone/>
+            </a:pPr>
+            <a:r>
+              <a:rPr lang="pl-PL" dirty="0" smtClean="0"/>
+              <a:t>ĆWICZENIE</a:t>
+            </a:r>
+          </a:p>
+          <a:p>
+            <a:r>
+              <a:rPr lang="pl-PL" dirty="0" smtClean="0"/>
+              <a:t>Uzupełnić </a:t>
+            </a:r>
+            <a:r>
+              <a:rPr lang="pl-PL" dirty="0" err="1" smtClean="0">
+                <a:latin typeface="Consolas" pitchFamily="49" charset="0"/>
+                <a:cs typeface="Consolas" pitchFamily="49" charset="0"/>
+              </a:rPr>
+              <a:t>scala_sugar.task.CDLibrary</a:t>
+            </a:r>
+            <a:r>
+              <a:rPr lang="pl-PL" dirty="0" smtClean="0"/>
+              <a:t>, </a:t>
+            </a:r>
+            <a:r>
+              <a:rPr lang="pl-PL" dirty="0" smtClean="0"/>
+              <a:t>tak aby </a:t>
+            </a:r>
+            <a:r>
+              <a:rPr lang="pl-PL" dirty="0" err="1" smtClean="0">
+                <a:latin typeface="Consolas" pitchFamily="49" charset="0"/>
+                <a:cs typeface="Consolas" pitchFamily="49" charset="0"/>
+              </a:rPr>
+              <a:t>CDLibraryTest</a:t>
+            </a:r>
+            <a:r>
+              <a:rPr lang="pl-PL" dirty="0" smtClean="0"/>
+              <a:t> przechodził pomyślnie</a:t>
+            </a:r>
+            <a:endParaRPr lang="pl-PL" dirty="0"/>
+          </a:p>
+        </p:txBody>
+      </p:sp>
     </p:spTree>
   </p:cSld>
   <p:clrMapOvr>
@@ -8143,189 +8844,6 @@
       </p:grpSpPr>
       <p:sp>
         <p:nvSpPr>
-          <p:cNvPr id="2" name="Symbol zastępczy daty 1"/>
-          <p:cNvSpPr>
-            <a:spLocks noGrp="1"/>
-          </p:cNvSpPr>
-          <p:nvPr>
-            <p:ph type="dt" sz="half" idx="10"/>
-          </p:nvPr>
-        </p:nvSpPr>
-        <p:spPr/>
-        <p:txBody>
-          <a:bodyPr/>
-          <a:lstStyle/>
-          <a:p>
-            <a:fld id="{359484F7-7C7A-4895-B82F-27C098609AFF}" type="datetime1">
-              <a:rPr lang="pl-PL" smtClean="0"/>
-              <a:pPr/>
-              <a:t>2013-07-14</a:t>
-            </a:fld>
-            <a:r>
-              <a:rPr lang="pl-PL" smtClean="0"/>
-              <a:t>  |  Gliwice</a:t>
-            </a:r>
-            <a:endParaRPr lang="pl-PL" dirty="0"/>
-          </a:p>
-        </p:txBody>
-      </p:sp>
-      <p:sp>
-        <p:nvSpPr>
-          <p:cNvPr id="3" name="Symbol zastępczy numeru slajdu 2"/>
-          <p:cNvSpPr>
-            <a:spLocks noGrp="1"/>
-          </p:cNvSpPr>
-          <p:nvPr>
-            <p:ph type="sldNum" sz="quarter" idx="12"/>
-          </p:nvPr>
-        </p:nvSpPr>
-        <p:spPr/>
-        <p:txBody>
-          <a:bodyPr/>
-          <a:lstStyle/>
-          <a:p>
-            <a:fld id="{AB8D87DA-8905-40F0-85F7-F6E49E4446E9}" type="slidenum">
-              <a:rPr lang="pl-PL" smtClean="0"/>
-              <a:pPr/>
-              <a:t>21</a:t>
-            </a:fld>
-            <a:endParaRPr lang="pl-PL"/>
-          </a:p>
-        </p:txBody>
-      </p:sp>
-      <p:sp>
-        <p:nvSpPr>
-          <p:cNvPr id="4" name="Symbol zastępczy zawartości 3"/>
-          <p:cNvSpPr>
-            <a:spLocks noGrp="1"/>
-          </p:cNvSpPr>
-          <p:nvPr>
-            <p:ph idx="1"/>
-          </p:nvPr>
-        </p:nvSpPr>
-        <p:spPr/>
-        <p:txBody>
-          <a:bodyPr/>
-          <a:lstStyle/>
-          <a:p>
-            <a:pPr>
-              <a:buNone/>
-            </a:pPr>
-            <a:r>
-              <a:rPr lang="pl-PL" dirty="0" smtClean="0"/>
-              <a:t>ĆWICZENIE</a:t>
-            </a:r>
-          </a:p>
-          <a:p>
-            <a:r>
-              <a:rPr lang="pl-PL" dirty="0" smtClean="0"/>
-              <a:t>Dla podanych tytułów książek pobrać liczbę </a:t>
-            </a:r>
-            <a:r>
-              <a:rPr lang="pl-PL" dirty="0" err="1" smtClean="0"/>
-              <a:t>Tweetów</a:t>
-            </a:r>
-            <a:r>
-              <a:rPr lang="pl-PL" dirty="0" smtClean="0"/>
-              <a:t> na ich temat przy użyciu nie-blokującego API</a:t>
-            </a:r>
-          </a:p>
-          <a:p>
-            <a:r>
-              <a:rPr lang="pl-PL" dirty="0" smtClean="0">
-                <a:latin typeface="Consolas" pitchFamily="49" charset="0"/>
-                <a:cs typeface="Consolas" pitchFamily="49" charset="0"/>
-              </a:rPr>
-              <a:t>Wykorzystać</a:t>
-            </a:r>
-          </a:p>
-          <a:p>
-            <a:pPr lvl="1"/>
-            <a:r>
-              <a:rPr lang="pl-PL" dirty="0" err="1" smtClean="0">
-                <a:latin typeface="Consolas" pitchFamily="49" charset="0"/>
-                <a:cs typeface="Consolas" pitchFamily="49" charset="0"/>
-              </a:rPr>
-              <a:t>ListeningExecutorService.submit</a:t>
-            </a:r>
-            <a:endParaRPr lang="pl-PL" dirty="0" smtClean="0">
-              <a:latin typeface="Consolas" pitchFamily="49" charset="0"/>
-              <a:cs typeface="Consolas" pitchFamily="49" charset="0"/>
-            </a:endParaRPr>
-          </a:p>
-          <a:p>
-            <a:pPr lvl="1"/>
-            <a:r>
-              <a:rPr lang="pl-PL" dirty="0" err="1" smtClean="0">
-                <a:latin typeface="Consolas" pitchFamily="49" charset="0"/>
-                <a:cs typeface="Consolas" pitchFamily="49" charset="0"/>
-              </a:rPr>
-              <a:t>Futures.allAsList</a:t>
-            </a:r>
-            <a:endParaRPr lang="pl-PL" dirty="0" smtClean="0"/>
-          </a:p>
-          <a:p>
-            <a:r>
-              <a:rPr lang="pl-PL" dirty="0" smtClean="0"/>
-              <a:t>Uruchamiamy klasę </a:t>
-            </a:r>
-            <a:r>
-              <a:rPr lang="pl-PL" dirty="0" err="1" smtClean="0">
-                <a:latin typeface="Consolas" pitchFamily="49" charset="0"/>
-                <a:cs typeface="Consolas" pitchFamily="49" charset="0"/>
-              </a:rPr>
-              <a:t>Task</a:t>
-            </a:r>
-            <a:r>
-              <a:rPr lang="pl-PL" dirty="0" smtClean="0"/>
-              <a:t> (Run As → Java </a:t>
-            </a:r>
-            <a:r>
-              <a:rPr lang="pl-PL" dirty="0" err="1" smtClean="0"/>
-              <a:t>Application</a:t>
-            </a:r>
-            <a:r>
-              <a:rPr lang="pl-PL" dirty="0" smtClean="0"/>
-              <a:t>).</a:t>
-            </a:r>
-            <a:endParaRPr lang="pl-PL" dirty="0"/>
-          </a:p>
-        </p:txBody>
-      </p:sp>
-    </p:spTree>
-  </p:cSld>
-  <p:clrMapOvr>
-    <a:masterClrMapping/>
-  </p:clrMapOvr>
-  <p:timing>
-    <p:tnLst>
-      <p:par>
-        <p:cTn id="1" dur="indefinite" restart="never" nodeType="tmRoot"/>
-      </p:par>
-    </p:tnLst>
-  </p:timing>
-</p:sld>
-</file>
-
-<file path=ppt/slides/slide22.xml><?xml version="1.0" encoding="utf-8"?>
-<p:sld xmlns:a="http://schemas.openxmlformats.org/drawingml/2006/main" xmlns:r="http://schemas.openxmlformats.org/officeDocument/2006/relationships" xmlns:p="http://schemas.openxmlformats.org/presentationml/2006/main">
-  <p:cSld>
-    <p:spTree>
-      <p:nvGrpSpPr>
-        <p:cNvPr id="1" name=""/>
-        <p:cNvGrpSpPr/>
-        <p:nvPr/>
-      </p:nvGrpSpPr>
-      <p:grpSpPr>
-        <a:xfrm>
-          <a:off x="0" y="0"/>
-          <a:ext cx="0" cy="0"/>
-          <a:chOff x="0" y="0"/>
-          <a:chExt cx="0" cy="0"/>
-        </a:xfrm>
-      </p:grpSpPr>
-      <p:sp>
-        <p:nvSpPr>
           <p:cNvPr id="2" name="Date Placeholder 1"/>
           <p:cNvSpPr>
             <a:spLocks noGrp="1"/>
@@ -8342,7 +8860,7 @@
             <a:fld id="{359484F7-7C7A-4895-B82F-27C098609AFF}" type="datetime1">
               <a:rPr lang="pl-PL" smtClean="0"/>
               <a:pPr/>
-              <a:t>2013-07-14</a:t>
+              <a:t>2013-07-28</a:t>
             </a:fld>
             <a:r>
               <a:rPr lang="pl-PL" smtClean="0"/>
@@ -8407,7 +8925,7 @@
             <a:fld id="{359484F7-7C7A-4895-B82F-27C098609AFF}" type="datetime1">
               <a:rPr lang="pl-PL" smtClean="0"/>
               <a:pPr/>
-              <a:t>2013-07-14</a:t>
+              <a:t>2013-07-28</a:t>
             </a:fld>
             <a:r>
               <a:rPr lang="pl-PL" smtClean="0"/>
@@ -8461,7 +8979,7 @@
             </a:pPr>
             <a:r>
               <a:rPr lang="pl-PL" dirty="0" smtClean="0"/>
-              <a:t>Czym jest Scala:</a:t>
+              <a:t>Cechy Scali:</a:t>
             </a:r>
           </a:p>
           <a:p>
@@ -8507,7 +9025,6 @@
               <a:rPr lang="pl-PL" dirty="0" smtClean="0"/>
               <a:t>Pełna interoperatywność z Javą</a:t>
             </a:r>
-            <a:endParaRPr lang="pl-PL" dirty="0" smtClean="0"/>
           </a:p>
         </p:txBody>
       </p:sp>
@@ -8566,7 +9083,7 @@
             <a:fld id="{359484F7-7C7A-4895-B82F-27C098609AFF}" type="datetime1">
               <a:rPr lang="pl-PL" smtClean="0"/>
               <a:pPr/>
-              <a:t>2013-07-14</a:t>
+              <a:t>2013-07-28</a:t>
             </a:fld>
             <a:r>
               <a:rPr lang="pl-PL" smtClean="0"/>
@@ -9457,7 +9974,7 @@
             <a:fld id="{359484F7-7C7A-4895-B82F-27C098609AFF}" type="datetime1">
               <a:rPr lang="pl-PL" smtClean="0"/>
               <a:pPr/>
-              <a:t>2013-07-14</a:t>
+              <a:t>2013-07-28</a:t>
             </a:fld>
             <a:r>
               <a:rPr lang="pl-PL" smtClean="0"/>
@@ -9932,7 +10449,7 @@
             <a:fld id="{359484F7-7C7A-4895-B82F-27C098609AFF}" type="datetime1">
               <a:rPr lang="pl-PL" smtClean="0"/>
               <a:pPr/>
-              <a:t>2013-07-14</a:t>
+              <a:t>2013-07-28</a:t>
             </a:fld>
             <a:r>
               <a:rPr lang="pl-PL" smtClean="0"/>
@@ -11088,7 +11605,7 @@
             <a:fld id="{359484F7-7C7A-4895-B82F-27C098609AFF}" type="datetime1">
               <a:rPr lang="pl-PL" smtClean="0"/>
               <a:pPr/>
-              <a:t>2013-07-14</a:t>
+              <a:t>2013-07-28</a:t>
             </a:fld>
             <a:r>
               <a:rPr lang="pl-PL" smtClean="0"/>
@@ -11167,6 +11684,21 @@
           </a:p>
           <a:p>
             <a:r>
+              <a:rPr lang="pl-PL" dirty="0" err="1" smtClean="0"/>
+              <a:t>Type</a:t>
+            </a:r>
+            <a:r>
+              <a:rPr lang="pl-PL" dirty="0" smtClean="0"/>
+              <a:t> </a:t>
+            </a:r>
+            <a:r>
+              <a:rPr lang="pl-PL" dirty="0" err="1" smtClean="0"/>
+              <a:t>inference</a:t>
+            </a:r>
+            <a:endParaRPr lang="pl-PL" dirty="0" smtClean="0"/>
+          </a:p>
+          <a:p>
+            <a:r>
               <a:rPr lang="pl-PL" dirty="0" smtClean="0"/>
               <a:t>Struktura plików</a:t>
             </a:r>
@@ -11188,8 +11720,27 @@
           </a:p>
           <a:p>
             <a:r>
-              <a:rPr lang="pl-PL" dirty="0" smtClean="0"/>
-              <a:t>Paradygmat obiektowy</a:t>
+              <a:rPr lang="pl-PL" dirty="0" err="1" smtClean="0"/>
+              <a:t>Pattern</a:t>
+            </a:r>
+            <a:r>
+              <a:rPr lang="pl-PL" dirty="0" smtClean="0"/>
+              <a:t> </a:t>
+            </a:r>
+            <a:r>
+              <a:rPr lang="pl-PL" dirty="0" err="1" smtClean="0"/>
+              <a:t>matching</a:t>
+            </a:r>
+            <a:endParaRPr lang="pl-PL" dirty="0" smtClean="0"/>
+          </a:p>
+          <a:p>
+            <a:r>
+              <a:rPr lang="pl-PL" dirty="0" smtClean="0"/>
+              <a:t>Paradygmat </a:t>
+            </a:r>
+            <a:r>
+              <a:rPr lang="pl-PL" dirty="0" smtClean="0"/>
+              <a:t>obiektowy</a:t>
             </a:r>
           </a:p>
           <a:p>
@@ -11202,45 +11753,7 @@
           <a:p>
             <a:r>
               <a:rPr lang="pl-PL" dirty="0" smtClean="0"/>
-              <a:t>Funkcje </a:t>
-            </a:r>
-            <a:r>
-              <a:rPr lang="pl-PL" dirty="0" smtClean="0"/>
-              <a:t>jako obywatele pierwszej kategorii</a:t>
-            </a:r>
-          </a:p>
-          <a:p>
-            <a:r>
-              <a:rPr lang="pl-PL" dirty="0" err="1" smtClean="0"/>
-              <a:t>Pattern</a:t>
-            </a:r>
-            <a:r>
-              <a:rPr lang="pl-PL" dirty="0" smtClean="0"/>
-              <a:t> </a:t>
-            </a:r>
-            <a:r>
-              <a:rPr lang="pl-PL" dirty="0" err="1" smtClean="0"/>
-              <a:t>matching</a:t>
-            </a:r>
-            <a:endParaRPr lang="pl-PL" dirty="0" smtClean="0"/>
-          </a:p>
-          <a:p>
-            <a:r>
-              <a:rPr lang="pl-PL" dirty="0" smtClean="0"/>
-              <a:t>Biblioteka </a:t>
-            </a:r>
-            <a:r>
-              <a:rPr lang="pl-PL" dirty="0" smtClean="0"/>
-              <a:t>standardowa</a:t>
-            </a:r>
-          </a:p>
-          <a:p>
-            <a:pPr>
-              <a:buNone/>
-            </a:pPr>
-            <a:r>
-              <a:rPr lang="pl-PL" dirty="0" smtClean="0"/>
-              <a:t>Jeśli starczy czasu…</a:t>
+              <a:t>Funkcje jako obywatele pierwszej kategorii</a:t>
             </a:r>
           </a:p>
           <a:p>
@@ -11253,14 +11766,9 @@
           <a:p>
             <a:r>
               <a:rPr lang="pl-PL" dirty="0" smtClean="0"/>
-              <a:t>Operatory</a:t>
-            </a:r>
-          </a:p>
-          <a:p>
-            <a:pPr>
-              <a:buNone/>
-            </a:pPr>
-            <a:endParaRPr lang="pl-PL" dirty="0"/>
+              <a:t>Biblioteka standardowa</a:t>
+            </a:r>
+            <a:endParaRPr lang="pl-PL" dirty="0" smtClean="0"/>
           </a:p>
         </p:txBody>
       </p:sp>
@@ -11307,7 +11815,7 @@
             <a:fld id="{359484F7-7C7A-4895-B82F-27C098609AFF}" type="datetime1">
               <a:rPr lang="pl-PL" smtClean="0"/>
               <a:pPr/>
-              <a:t>2013-07-14</a:t>
+              <a:t>2013-07-28</a:t>
             </a:fld>
             <a:r>
               <a:rPr lang="pl-PL" smtClean="0"/>
@@ -11411,24 +11919,8 @@
             <a:pPr lvl="1"/>
             <a:r>
               <a:rPr lang="pl-PL" dirty="0" smtClean="0"/>
-              <a:t>W prostych przypadkach kropki i </a:t>
-            </a:r>
-            <a:r>
-              <a:rPr lang="pl-PL" dirty="0" smtClean="0"/>
-              <a:t>nawiasy</a:t>
-            </a:r>
-          </a:p>
-          <a:p>
-            <a:pPr lvl="1"/>
-            <a:r>
-              <a:rPr lang="pl-PL" dirty="0" smtClean="0"/>
-              <a:t>Operatory == i </a:t>
-            </a:r>
-            <a:r>
-              <a:rPr lang="pl-PL" dirty="0" err="1" smtClean="0"/>
-              <a:t>refEq</a:t>
-            </a:r>
-            <a:endParaRPr lang="pl-PL" dirty="0" smtClean="0"/>
+              <a:t>W prostych przypadkach kropki i nawiasy</a:t>
+            </a:r>
           </a:p>
           <a:p>
             <a:r>
@@ -11479,6 +11971,30 @@
               </a:rPr>
               <a:t>BeanProperty</a:t>
             </a:r>
+            <a:endParaRPr lang="pl-PL" dirty="0" smtClean="0">
+              <a:latin typeface="Consolas" pitchFamily="49" charset="0"/>
+              <a:cs typeface="Consolas" pitchFamily="49" charset="0"/>
+            </a:endParaRPr>
+          </a:p>
+          <a:p>
+            <a:r>
+              <a:rPr lang="pl-PL" dirty="0" smtClean="0"/>
+              <a:t>Krotki</a:t>
+            </a:r>
+          </a:p>
+          <a:p>
+            <a:r>
+              <a:rPr lang="pl-PL" dirty="0" smtClean="0"/>
+              <a:t>Argumenty z wartościami domyślnymi</a:t>
+            </a:r>
+          </a:p>
+          <a:p>
+            <a:r>
+              <a:rPr lang="pl-PL" dirty="0" smtClean="0"/>
+              <a:t>Nazwane argumenty</a:t>
+            </a:r>
+          </a:p>
+          <a:p>
             <a:endParaRPr lang="pl-PL" dirty="0">
               <a:latin typeface="Consolas" pitchFamily="49" charset="0"/>
               <a:cs typeface="Consolas" pitchFamily="49" charset="0"/>
@@ -11529,7 +12045,7 @@
             <a:fld id="{359484F7-7C7A-4895-B82F-27C098609AFF}" type="datetime1">
               <a:rPr lang="pl-PL" smtClean="0"/>
               <a:pPr/>
-              <a:t>2013-07-14</a:t>
+              <a:t>2013-07-28</a:t>
             </a:fld>
             <a:r>
               <a:rPr lang="pl-PL" smtClean="0"/>

</xml_diff>